<commit_message>
Add literature research for interaction and UCD process
</commit_message>
<xml_diff>
--- a/usabilityEngineering/A1/TW_literatureResearch.pptx
+++ b/usabilityEngineering/A1/TW_literatureResearch.pptx
@@ -6,8 +6,11 @@
   </p:sldMasterIdLst>
   <p:sldIdLst>
     <p:sldId id="256" r:id="rId2"/>
-    <p:sldId id="259" r:id="rId3"/>
-    <p:sldId id="260" r:id="rId4"/>
+    <p:sldId id="261" r:id="rId3"/>
+    <p:sldId id="262" r:id="rId4"/>
+    <p:sldId id="263" r:id="rId5"/>
+    <p:sldId id="260" r:id="rId6"/>
+    <p:sldId id="264" r:id="rId7"/>
   </p:sldIdLst>
   <p:sldSz cx="12192000" cy="6858000"/>
   <p:notesSz cx="6858000" cy="9144000"/>
@@ -106,6 +109,11 @@
       </a:defRPr>
     </a:lvl9pPr>
   </p:defaultTextStyle>
+  <p:extLst>
+    <p:ext uri="{EFAFB233-063F-42B5-8137-9DF3F51BA10A}">
+      <p15:sldGuideLst xmlns:p15="http://schemas.microsoft.com/office/powerpoint/2012/main"/>
+    </p:ext>
+  </p:extLst>
 </p:presentation>
 </file>
 
@@ -305,7 +313,7 @@
           <a:p>
             <a:fld id="{96DFF08F-DC6B-4601-B491-B0F83F6DD2DA}" type="datetimeFigureOut">
               <a:rPr lang="en-US" dirty="0"/>
-              <a:t>11/8/2016</a:t>
+              <a:t>11/9/2016</a:t>
             </a:fld>
             <a:endParaRPr lang="en-US" dirty="0"/>
           </a:p>
@@ -521,7 +529,7 @@
           <a:p>
             <a:fld id="{96DFF08F-DC6B-4601-B491-B0F83F6DD2DA}" type="datetimeFigureOut">
               <a:rPr lang="en-US" dirty="0"/>
-              <a:t>11/8/2016</a:t>
+              <a:t>11/9/2016</a:t>
             </a:fld>
             <a:endParaRPr lang="en-US" dirty="0"/>
           </a:p>
@@ -696,7 +704,7 @@
           <a:p>
             <a:fld id="{96DFF08F-DC6B-4601-B491-B0F83F6DD2DA}" type="datetimeFigureOut">
               <a:rPr lang="en-US" dirty="0"/>
-              <a:t>11/8/2016</a:t>
+              <a:t>11/9/2016</a:t>
             </a:fld>
             <a:endParaRPr lang="en-US" dirty="0"/>
           </a:p>
@@ -861,7 +869,7 @@
           <a:p>
             <a:fld id="{96DFF08F-DC6B-4601-B491-B0F83F6DD2DA}" type="datetimeFigureOut">
               <a:rPr lang="en-US" dirty="0"/>
-              <a:t>11/8/2016</a:t>
+              <a:t>11/9/2016</a:t>
             </a:fld>
             <a:endParaRPr lang="en-US" dirty="0"/>
           </a:p>
@@ -1107,7 +1115,7 @@
           <a:p>
             <a:fld id="{96DFF08F-DC6B-4601-B491-B0F83F6DD2DA}" type="datetimeFigureOut">
               <a:rPr lang="en-US" dirty="0"/>
-              <a:t>11/8/2016</a:t>
+              <a:t>11/9/2016</a:t>
             </a:fld>
             <a:endParaRPr lang="en-US" dirty="0"/>
           </a:p>
@@ -1425,7 +1433,7 @@
           <a:p>
             <a:fld id="{96DFF08F-DC6B-4601-B491-B0F83F6DD2DA}" type="datetimeFigureOut">
               <a:rPr lang="en-US" dirty="0"/>
-              <a:t>11/8/2016</a:t>
+              <a:t>11/9/2016</a:t>
             </a:fld>
             <a:endParaRPr lang="en-US" dirty="0"/>
           </a:p>
@@ -1844,7 +1852,7 @@
           <a:p>
             <a:fld id="{96DFF08F-DC6B-4601-B491-B0F83F6DD2DA}" type="datetimeFigureOut">
               <a:rPr lang="en-US" dirty="0"/>
-              <a:t>11/8/2016</a:t>
+              <a:t>11/9/2016</a:t>
             </a:fld>
             <a:endParaRPr lang="en-US" dirty="0"/>
           </a:p>
@@ -1957,7 +1965,7 @@
           <a:p>
             <a:fld id="{96DFF08F-DC6B-4601-B491-B0F83F6DD2DA}" type="datetimeFigureOut">
               <a:rPr lang="en-US" dirty="0"/>
-              <a:t>11/8/2016</a:t>
+              <a:t>11/9/2016</a:t>
             </a:fld>
             <a:endParaRPr lang="en-US" dirty="0"/>
           </a:p>
@@ -2047,7 +2055,7 @@
           <a:p>
             <a:fld id="{96DFF08F-DC6B-4601-B491-B0F83F6DD2DA}" type="datetimeFigureOut">
               <a:rPr lang="en-US" dirty="0"/>
-              <a:t>11/8/2016</a:t>
+              <a:t>11/9/2016</a:t>
             </a:fld>
             <a:endParaRPr lang="en-US" dirty="0"/>
           </a:p>
@@ -2332,7 +2340,7 @@
           <a:p>
             <a:fld id="{96DFF08F-DC6B-4601-B491-B0F83F6DD2DA}" type="datetimeFigureOut">
               <a:rPr lang="en-US" dirty="0"/>
-              <a:t>11/8/2016</a:t>
+              <a:t>11/9/2016</a:t>
             </a:fld>
             <a:endParaRPr lang="en-US" dirty="0"/>
           </a:p>
@@ -2599,7 +2607,7 @@
           <a:p>
             <a:fld id="{96DFF08F-DC6B-4601-B491-B0F83F6DD2DA}" type="datetimeFigureOut">
               <a:rPr lang="en-US" dirty="0"/>
-              <a:t>11/8/2016</a:t>
+              <a:t>11/9/2016</a:t>
             </a:fld>
             <a:endParaRPr lang="en-US" dirty="0"/>
           </a:p>
@@ -2849,7 +2857,7 @@
             <a:fld id="{96DFF08F-DC6B-4601-B491-B0F83F6DD2DA}" type="datetimeFigureOut">
               <a:rPr lang="en-US" dirty="0"/>
               <a:pPr/>
-              <a:t>11/8/2016</a:t>
+              <a:t>11/9/2016</a:t>
             </a:fld>
             <a:endParaRPr lang="en-US" dirty="0"/>
           </a:p>
@@ -3325,12 +3333,20 @@
               <a:rPr lang="de-DE" sz="2400" dirty="0" err="1"/>
               <a:t>Literature</a:t>
             </a:r>
+            <a:r>
+              <a:rPr lang="de-DE" sz="2400" dirty="0"/>
+              <a:t/>
+            </a:r>
             <a:br>
               <a:rPr lang="de-DE" sz="2400" dirty="0"/>
             </a:br>
             <a:r>
               <a:rPr lang="de-DE" sz="2400" dirty="0"/>
               <a:t>-</a:t>
+            </a:r>
+            <a:r>
+              <a:rPr lang="de-DE" dirty="0"/>
+              <a:t/>
             </a:r>
             <a:br>
               <a:rPr lang="de-DE" dirty="0"/>
@@ -3461,16 +3477,20 @@
           <a:lstStyle/>
           <a:p>
             <a:r>
-              <a:rPr lang="de-DE" dirty="0" err="1"/>
-              <a:t>Example</a:t>
-            </a:r>
-            <a:r>
-              <a:rPr lang="de-DE" dirty="0"/>
-              <a:t> </a:t>
-            </a:r>
-            <a:r>
-              <a:rPr lang="de-DE" dirty="0" err="1"/>
-              <a:t>slide</a:t>
+              <a:rPr lang="de-DE" dirty="0" smtClean="0"/>
+              <a:t>Interaction </a:t>
+            </a:r>
+            <a:r>
+              <a:rPr lang="de-DE" dirty="0" err="1" smtClean="0"/>
+              <a:t>with</a:t>
+            </a:r>
+            <a:r>
+              <a:rPr lang="de-DE" dirty="0" smtClean="0"/>
+              <a:t> mobile </a:t>
+            </a:r>
+            <a:r>
+              <a:rPr lang="de-DE" dirty="0" err="1" smtClean="0"/>
+              <a:t>devices</a:t>
             </a:r>
             <a:endParaRPr lang="de-DE" dirty="0"/>
           </a:p>
@@ -3488,8 +3508,8 @@
         </p:nvSpPr>
         <p:spPr>
           <a:xfrm>
-            <a:off x="1143000" y="2001511"/>
-            <a:ext cx="7296150" cy="756000"/>
+            <a:off x="1142999" y="2001511"/>
+            <a:ext cx="9063681" cy="756000"/>
           </a:xfrm>
         </p:spPr>
         <p:txBody>
@@ -3497,15 +3517,72 @@
           <a:lstStyle/>
           <a:p>
             <a:r>
-              <a:rPr lang="de-DE" dirty="0">
+              <a:rPr lang="de-DE" dirty="0" err="1" smtClean="0">
                 <a:solidFill>
                   <a:schemeClr val="accent4">
                     <a:lumMod val="75000"/>
                   </a:schemeClr>
                 </a:solidFill>
               </a:rPr>
-              <a:t>Das Template</a:t>
-            </a:r>
+              <a:t>Bimanual</a:t>
+            </a:r>
+            <a:r>
+              <a:rPr lang="de-DE" dirty="0" smtClean="0">
+                <a:solidFill>
+                  <a:schemeClr val="accent4">
+                    <a:lumMod val="75000"/>
+                  </a:schemeClr>
+                </a:solidFill>
+              </a:rPr>
+              <a:t> Interaction </a:t>
+            </a:r>
+            <a:r>
+              <a:rPr lang="de-DE" baseline="-25000" dirty="0" smtClean="0">
+                <a:solidFill>
+                  <a:schemeClr val="accent4">
+                    <a:lumMod val="75000"/>
+                  </a:schemeClr>
+                </a:solidFill>
+              </a:rPr>
+              <a:t>(</a:t>
+            </a:r>
+            <a:r>
+              <a:rPr lang="de-DE" baseline="-25000" dirty="0" err="1" smtClean="0">
+                <a:solidFill>
+                  <a:schemeClr val="accent4">
+                    <a:lumMod val="75000"/>
+                  </a:schemeClr>
+                </a:solidFill>
+              </a:rPr>
+              <a:t>see</a:t>
+            </a:r>
+            <a:r>
+              <a:rPr lang="de-DE" baseline="-25000" dirty="0">
+                <a:solidFill>
+                  <a:schemeClr val="accent4">
+                    <a:lumMod val="75000"/>
+                  </a:schemeClr>
+                </a:solidFill>
+              </a:rPr>
+              <a:t> [OULASVIRTA2011, GUIARD1987, </a:t>
+            </a:r>
+            <a:r>
+              <a:rPr lang="de-DE" baseline="-25000" dirty="0" smtClean="0">
+                <a:solidFill>
+                  <a:schemeClr val="accent4">
+                    <a:lumMod val="75000"/>
+                  </a:schemeClr>
+                </a:solidFill>
+              </a:rPr>
+              <a:t>WAGNER2012])</a:t>
+            </a:r>
+            <a:endParaRPr lang="de-DE" baseline="-25000" dirty="0">
+              <a:solidFill>
+                <a:schemeClr val="accent4">
+                  <a:lumMod val="75000"/>
+                </a:schemeClr>
+              </a:solidFill>
+            </a:endParaRPr>
           </a:p>
         </p:txBody>
       </p:sp>
@@ -3522,81 +3599,7 @@
         <p:spPr>
           <a:xfrm>
             <a:off x="1143000" y="2721483"/>
-            <a:ext cx="8210550" cy="1332000"/>
-          </a:xfrm>
-        </p:spPr>
-        <p:txBody>
-          <a:bodyPr/>
-          <a:lstStyle/>
-          <a:p>
-            <a:r>
-              <a:rPr lang="de-DE" dirty="0"/>
-              <a:t>Das </a:t>
-            </a:r>
-            <a:r>
-              <a:rPr lang="de-DE" dirty="0" err="1"/>
-              <a:t>template</a:t>
-            </a:r>
-            <a:r>
-              <a:rPr lang="de-DE" dirty="0"/>
-              <a:t> zum Ausfüllen findet ihr auf der nächsten Seite</a:t>
-            </a:r>
-          </a:p>
-          <a:p>
-            <a:r>
-              <a:rPr lang="de-DE" dirty="0"/>
-              <a:t>Das ist super. </a:t>
-            </a:r>
-          </a:p>
-        </p:txBody>
-      </p:sp>
-      <p:sp>
-        <p:nvSpPr>
-          <p:cNvPr id="5" name="Textplatzhalter 4"/>
-          <p:cNvSpPr>
-            <a:spLocks noGrp="1"/>
-          </p:cNvSpPr>
-          <p:nvPr>
-            <p:ph type="body" sz="quarter" idx="3"/>
-          </p:nvPr>
-        </p:nvSpPr>
-        <p:spPr>
-          <a:xfrm>
-            <a:off x="1143000" y="4395455"/>
-            <a:ext cx="7296150" cy="756000"/>
-          </a:xfrm>
-        </p:spPr>
-        <p:txBody>
-          <a:bodyPr/>
-          <a:lstStyle/>
-          <a:p>
-            <a:r>
-              <a:rPr lang="de-DE" dirty="0">
-                <a:solidFill>
-                  <a:schemeClr val="accent4">
-                    <a:lumMod val="75000"/>
-                  </a:schemeClr>
-                </a:solidFill>
-              </a:rPr>
-              <a:t>Die Sprache</a:t>
-            </a:r>
-          </a:p>
-        </p:txBody>
-      </p:sp>
-      <p:sp>
-        <p:nvSpPr>
-          <p:cNvPr id="6" name="Inhaltsplatzhalter 5"/>
-          <p:cNvSpPr>
-            <a:spLocks noGrp="1"/>
-          </p:cNvSpPr>
-          <p:nvPr>
-            <p:ph sz="quarter" idx="4"/>
-          </p:nvPr>
-        </p:nvSpPr>
-        <p:spPr>
-          <a:xfrm>
-            <a:off x="1143000" y="5115425"/>
-            <a:ext cx="8210550" cy="1332000"/>
+            <a:ext cx="8210550" cy="1479814"/>
           </a:xfrm>
         </p:spPr>
         <p:txBody>
@@ -3606,23 +3609,300 @@
           <a:lstStyle/>
           <a:p>
             <a:r>
+              <a:rPr lang="de-DE" dirty="0" err="1" smtClean="0"/>
+              <a:t>Especially</a:t>
+            </a:r>
+            <a:r>
+              <a:rPr lang="de-DE" dirty="0" smtClean="0"/>
+              <a:t>  </a:t>
+            </a:r>
+            <a:r>
+              <a:rPr lang="de-DE" dirty="0" err="1" smtClean="0"/>
+              <a:t>for</a:t>
+            </a:r>
+            <a:r>
+              <a:rPr lang="de-DE" dirty="0" smtClean="0"/>
+              <a:t> an </a:t>
+            </a:r>
+            <a:r>
+              <a:rPr lang="de-DE" dirty="0" err="1" smtClean="0"/>
+              <a:t>application</a:t>
+            </a:r>
+            <a:r>
+              <a:rPr lang="de-DE" dirty="0" smtClean="0"/>
+              <a:t> </a:t>
+            </a:r>
+            <a:r>
+              <a:rPr lang="de-DE" dirty="0" err="1" smtClean="0"/>
+              <a:t>used</a:t>
+            </a:r>
+            <a:r>
+              <a:rPr lang="de-DE" dirty="0" smtClean="0"/>
+              <a:t> </a:t>
+            </a:r>
+            <a:r>
+              <a:rPr lang="de-DE" dirty="0" err="1" smtClean="0"/>
+              <a:t>while</a:t>
+            </a:r>
+            <a:r>
+              <a:rPr lang="de-DE" dirty="0" smtClean="0"/>
+              <a:t> </a:t>
+            </a:r>
+            <a:r>
+              <a:rPr lang="de-DE" dirty="0" err="1" smtClean="0"/>
+              <a:t>shopping</a:t>
+            </a:r>
+            <a:endParaRPr lang="de-DE" dirty="0" smtClean="0"/>
+          </a:p>
+        </p:txBody>
+      </p:sp>
+      <p:sp>
+        <p:nvSpPr>
+          <p:cNvPr id="5" name="Textplatzhalter 4"/>
+          <p:cNvSpPr>
+            <a:spLocks noGrp="1"/>
+          </p:cNvSpPr>
+          <p:nvPr>
+            <p:ph type="body" sz="quarter" idx="3"/>
+          </p:nvPr>
+        </p:nvSpPr>
+        <p:spPr>
+          <a:xfrm>
+            <a:off x="1118286" y="4201866"/>
+            <a:ext cx="7296150" cy="756000"/>
+          </a:xfrm>
+        </p:spPr>
+        <p:txBody>
+          <a:bodyPr/>
+          <a:lstStyle/>
+          <a:p>
+            <a:r>
+              <a:rPr lang="de-DE" dirty="0" err="1">
+                <a:solidFill>
+                  <a:schemeClr val="accent4">
+                    <a:lumMod val="75000"/>
+                  </a:schemeClr>
+                </a:solidFill>
+              </a:rPr>
+              <a:t>Shortcomings</a:t>
+            </a:r>
+            <a:r>
+              <a:rPr lang="de-DE" dirty="0">
+                <a:solidFill>
+                  <a:schemeClr val="accent4">
+                    <a:lumMod val="75000"/>
+                  </a:schemeClr>
+                </a:solidFill>
+              </a:rPr>
+              <a:t> </a:t>
+            </a:r>
+            <a:r>
+              <a:rPr lang="de-DE" dirty="0" err="1">
+                <a:solidFill>
+                  <a:schemeClr val="accent4">
+                    <a:lumMod val="75000"/>
+                  </a:schemeClr>
+                </a:solidFill>
+              </a:rPr>
+              <a:t>and</a:t>
+            </a:r>
+            <a:r>
+              <a:rPr lang="de-DE" dirty="0">
+                <a:solidFill>
+                  <a:schemeClr val="accent4">
+                    <a:lumMod val="75000"/>
+                  </a:schemeClr>
+                </a:solidFill>
+              </a:rPr>
+              <a:t> potential </a:t>
+            </a:r>
+            <a:r>
+              <a:rPr lang="de-DE" dirty="0" err="1">
+                <a:solidFill>
+                  <a:schemeClr val="accent4">
+                    <a:lumMod val="75000"/>
+                  </a:schemeClr>
+                </a:solidFill>
+              </a:rPr>
+              <a:t>of</a:t>
+            </a:r>
+            <a:r>
+              <a:rPr lang="de-DE" dirty="0">
+                <a:solidFill>
+                  <a:schemeClr val="accent4">
+                    <a:lumMod val="75000"/>
+                  </a:schemeClr>
+                </a:solidFill>
+              </a:rPr>
+              <a:t> </a:t>
+            </a:r>
+            <a:r>
+              <a:rPr lang="de-DE" dirty="0" err="1">
+                <a:solidFill>
+                  <a:schemeClr val="accent4">
+                    <a:lumMod val="75000"/>
+                  </a:schemeClr>
+                </a:solidFill>
+              </a:rPr>
+              <a:t>touch</a:t>
+            </a:r>
+            <a:r>
+              <a:rPr lang="de-DE" dirty="0">
+                <a:solidFill>
+                  <a:schemeClr val="accent4">
+                    <a:lumMod val="75000"/>
+                  </a:schemeClr>
+                </a:solidFill>
+              </a:rPr>
+              <a:t> </a:t>
+            </a:r>
+            <a:r>
+              <a:rPr lang="de-DE" dirty="0" err="1">
+                <a:solidFill>
+                  <a:schemeClr val="accent4">
+                    <a:lumMod val="75000"/>
+                  </a:schemeClr>
+                </a:solidFill>
+              </a:rPr>
+              <a:t>input</a:t>
+            </a:r>
+            <a:endParaRPr lang="de-DE" dirty="0">
+              <a:solidFill>
+                <a:schemeClr val="accent4">
+                  <a:lumMod val="75000"/>
+                </a:schemeClr>
+              </a:solidFill>
+            </a:endParaRPr>
+          </a:p>
+        </p:txBody>
+      </p:sp>
+      <p:sp>
+        <p:nvSpPr>
+          <p:cNvPr id="6" name="Inhaltsplatzhalter 5"/>
+          <p:cNvSpPr>
+            <a:spLocks noGrp="1"/>
+          </p:cNvSpPr>
+          <p:nvPr>
+            <p:ph sz="quarter" idx="4"/>
+          </p:nvPr>
+        </p:nvSpPr>
+        <p:spPr>
+          <a:xfrm>
+            <a:off x="1142999" y="4983620"/>
+            <a:ext cx="7234881" cy="1332000"/>
+          </a:xfrm>
+        </p:spPr>
+        <p:txBody>
+          <a:bodyPr>
+            <a:normAutofit/>
+          </a:bodyPr>
+          <a:lstStyle/>
+          <a:p>
+            <a:r>
+              <a:rPr lang="de-DE" dirty="0" err="1"/>
+              <a:t>FFitts</a:t>
+            </a:r>
+            <a:r>
               <a:rPr lang="de-DE" dirty="0"/>
-              <a:t>Ilhan wünscht sich englische Doku. Das ist blöd</a:t>
-            </a:r>
-          </a:p>
-          <a:p>
+              <a:t> </a:t>
+            </a:r>
+            <a:r>
+              <a:rPr lang="de-DE" dirty="0" err="1"/>
+              <a:t>law</a:t>
+            </a:r>
             <a:r>
               <a:rPr lang="de-DE" dirty="0"/>
-              <a:t>Aber man kann ja auch Bilder zum Veranschaulichen verwenden anstatt </a:t>
-            </a:r>
+              <a:t> </a:t>
+            </a:r>
+            <a:r>
+              <a:rPr lang="de-DE" baseline="-25000" dirty="0"/>
+              <a:t>[BI2013]</a:t>
+            </a:r>
+          </a:p>
+          <a:p>
             <a:r>
               <a:rPr lang="de-DE" dirty="0" err="1"/>
-              <a:t>text</a:t>
+              <a:t>Perception</a:t>
             </a:r>
             <a:r>
               <a:rPr lang="de-DE" dirty="0"/>
-              <a:t>.</a:t>
-            </a:r>
+              <a:t> </a:t>
+            </a:r>
+            <a:r>
+              <a:rPr lang="de-DE" dirty="0" err="1"/>
+              <a:t>and</a:t>
+            </a:r>
+            <a:r>
+              <a:rPr lang="de-DE" dirty="0"/>
+              <a:t> </a:t>
+            </a:r>
+            <a:r>
+              <a:rPr lang="de-DE" dirty="0" err="1"/>
+              <a:t>improvement</a:t>
+            </a:r>
+            <a:r>
+              <a:rPr lang="de-DE" dirty="0"/>
+              <a:t> </a:t>
+            </a:r>
+            <a:r>
+              <a:rPr lang="de-DE" dirty="0" err="1"/>
+              <a:t>of</a:t>
+            </a:r>
+            <a:r>
+              <a:rPr lang="de-DE" dirty="0"/>
+              <a:t> </a:t>
+            </a:r>
+            <a:r>
+              <a:rPr lang="de-DE" dirty="0" err="1"/>
+              <a:t>input</a:t>
+            </a:r>
+            <a:r>
+              <a:rPr lang="de-DE" dirty="0"/>
+              <a:t> </a:t>
+            </a:r>
+            <a:r>
+              <a:rPr lang="de-DE" dirty="0" err="1"/>
+              <a:t>precision</a:t>
+            </a:r>
+            <a:r>
+              <a:rPr lang="de-DE" dirty="0"/>
+              <a:t> </a:t>
+            </a:r>
+            <a:r>
+              <a:rPr lang="de-DE" baseline="-25000" dirty="0" smtClean="0"/>
+              <a:t>[</a:t>
+            </a:r>
+            <a:r>
+              <a:rPr lang="de-DE" baseline="-25000" dirty="0"/>
+              <a:t>GUTWIN2014, </a:t>
+            </a:r>
+            <a:r>
+              <a:rPr lang="de-DE" baseline="-25000" dirty="0" smtClean="0"/>
+              <a:t>HOLZ2010</a:t>
+            </a:r>
+            <a:r>
+              <a:rPr lang="de-DE" baseline="-25000" dirty="0"/>
+              <a:t>, </a:t>
+            </a:r>
+            <a:r>
+              <a:rPr lang="de-DE" baseline="-25000" dirty="0" smtClean="0"/>
+              <a:t>POTTER88</a:t>
+            </a:r>
+            <a:r>
+              <a:rPr lang="de-DE" baseline="-25000" dirty="0"/>
+              <a:t>, ROTH2009, </a:t>
+            </a:r>
+            <a:r>
+              <a:rPr lang="de-DE" baseline="-25000" dirty="0" smtClean="0"/>
+              <a:t>ROUDAUT2009, WORDEN1997]</a:t>
+            </a:r>
+            <a:endParaRPr lang="de-DE" baseline="-25000" dirty="0"/>
+          </a:p>
+          <a:p>
+            <a:endParaRPr lang="de-DE" dirty="0"/>
+          </a:p>
+          <a:p>
+            <a:endParaRPr lang="de-DE" baseline="-25000" dirty="0"/>
           </a:p>
         </p:txBody>
       </p:sp>
@@ -3674,10 +3954,366 @@
           </a:extLst>
         </p:spPr>
       </p:pic>
+      <p:sp>
+        <p:nvSpPr>
+          <p:cNvPr id="8" name="Textplatzhalter 2"/>
+          <p:cNvSpPr txBox="1">
+            <a:spLocks/>
+          </p:cNvSpPr>
+          <p:nvPr/>
+        </p:nvSpPr>
+        <p:spPr>
+          <a:xfrm>
+            <a:off x="1138880" y="3340161"/>
+            <a:ext cx="9063681" cy="756000"/>
+          </a:xfrm>
+          <a:prstGeom prst="rect">
+            <a:avLst/>
+          </a:prstGeom>
+        </p:spPr>
+        <p:txBody>
+          <a:bodyPr vert="horz" lIns="91440" tIns="45720" rIns="91440" bIns="45720" rtlCol="0" anchor="ctr">
+            <a:normAutofit/>
+          </a:bodyPr>
+          <a:lstStyle>
+            <a:lvl1pPr marL="0" indent="0" algn="l" defTabSz="914400" rtl="0" eaLnBrk="1" latinLnBrk="0" hangingPunct="1">
+              <a:lnSpc>
+                <a:spcPct val="90000"/>
+              </a:lnSpc>
+              <a:spcBef>
+                <a:spcPts val="0"/>
+              </a:spcBef>
+              <a:buClr>
+                <a:schemeClr val="accent1"/>
+              </a:buClr>
+              <a:buSzPct val="80000"/>
+              <a:buFont typeface="Corbel" pitchFamily="34" charset="0"/>
+              <a:buNone/>
+              <a:defRPr sz="2400" b="1" kern="1200">
+                <a:solidFill>
+                  <a:schemeClr val="accent1"/>
+                </a:solidFill>
+                <a:latin typeface="+mn-lt"/>
+                <a:ea typeface="+mn-ea"/>
+                <a:cs typeface="+mn-cs"/>
+              </a:defRPr>
+            </a:lvl1pPr>
+            <a:lvl2pPr marL="457200" indent="0" algn="l" defTabSz="914400" rtl="0" eaLnBrk="1" latinLnBrk="0" hangingPunct="1">
+              <a:lnSpc>
+                <a:spcPct val="90000"/>
+              </a:lnSpc>
+              <a:spcBef>
+                <a:spcPts val="200"/>
+              </a:spcBef>
+              <a:spcAft>
+                <a:spcPts val="400"/>
+              </a:spcAft>
+              <a:buClr>
+                <a:schemeClr val="accent1"/>
+              </a:buClr>
+              <a:buSzPct val="80000"/>
+              <a:buFont typeface="Corbel" pitchFamily="34" charset="0"/>
+              <a:buNone/>
+              <a:defRPr sz="2000" b="1" kern="1200">
+                <a:solidFill>
+                  <a:schemeClr val="accent1"/>
+                </a:solidFill>
+                <a:latin typeface="+mn-lt"/>
+                <a:ea typeface="+mn-ea"/>
+                <a:cs typeface="+mn-cs"/>
+              </a:defRPr>
+            </a:lvl2pPr>
+            <a:lvl3pPr marL="914400" indent="0" algn="l" defTabSz="914400" rtl="0" eaLnBrk="1" latinLnBrk="0" hangingPunct="1">
+              <a:lnSpc>
+                <a:spcPct val="90000"/>
+              </a:lnSpc>
+              <a:spcBef>
+                <a:spcPts val="200"/>
+              </a:spcBef>
+              <a:spcAft>
+                <a:spcPts val="400"/>
+              </a:spcAft>
+              <a:buClr>
+                <a:schemeClr val="accent1"/>
+              </a:buClr>
+              <a:buSzPct val="80000"/>
+              <a:buFont typeface="Corbel" pitchFamily="34" charset="0"/>
+              <a:buNone/>
+              <a:defRPr sz="1800" b="1" kern="1200">
+                <a:solidFill>
+                  <a:schemeClr val="accent1"/>
+                </a:solidFill>
+                <a:latin typeface="+mn-lt"/>
+                <a:ea typeface="+mn-ea"/>
+                <a:cs typeface="+mn-cs"/>
+              </a:defRPr>
+            </a:lvl3pPr>
+            <a:lvl4pPr marL="1371600" indent="0" algn="l" defTabSz="914400" rtl="0" eaLnBrk="1" latinLnBrk="0" hangingPunct="1">
+              <a:lnSpc>
+                <a:spcPct val="90000"/>
+              </a:lnSpc>
+              <a:spcBef>
+                <a:spcPts val="200"/>
+              </a:spcBef>
+              <a:spcAft>
+                <a:spcPts val="400"/>
+              </a:spcAft>
+              <a:buClr>
+                <a:schemeClr val="accent1"/>
+              </a:buClr>
+              <a:buSzPct val="80000"/>
+              <a:buFont typeface="Corbel" pitchFamily="34" charset="0"/>
+              <a:buNone/>
+              <a:defRPr sz="1600" b="1" kern="1200">
+                <a:solidFill>
+                  <a:schemeClr val="accent1"/>
+                </a:solidFill>
+                <a:latin typeface="+mn-lt"/>
+                <a:ea typeface="+mn-ea"/>
+                <a:cs typeface="+mn-cs"/>
+              </a:defRPr>
+            </a:lvl4pPr>
+            <a:lvl5pPr marL="1828800" indent="0" algn="l" defTabSz="914400" rtl="0" eaLnBrk="1" latinLnBrk="0" hangingPunct="1">
+              <a:lnSpc>
+                <a:spcPct val="90000"/>
+              </a:lnSpc>
+              <a:spcBef>
+                <a:spcPts val="200"/>
+              </a:spcBef>
+              <a:spcAft>
+                <a:spcPts val="400"/>
+              </a:spcAft>
+              <a:buClr>
+                <a:schemeClr val="accent1"/>
+              </a:buClr>
+              <a:buSzPct val="80000"/>
+              <a:buFont typeface="Corbel" pitchFamily="34" charset="0"/>
+              <a:buNone/>
+              <a:defRPr sz="1600" b="1" kern="1200">
+                <a:solidFill>
+                  <a:schemeClr val="accent1"/>
+                </a:solidFill>
+                <a:latin typeface="+mn-lt"/>
+                <a:ea typeface="+mn-ea"/>
+                <a:cs typeface="+mn-cs"/>
+              </a:defRPr>
+            </a:lvl5pPr>
+            <a:lvl6pPr marL="2286000" indent="0" algn="l" defTabSz="914400" rtl="0" eaLnBrk="1" latinLnBrk="0" hangingPunct="1">
+              <a:lnSpc>
+                <a:spcPct val="90000"/>
+              </a:lnSpc>
+              <a:spcBef>
+                <a:spcPts val="200"/>
+              </a:spcBef>
+              <a:spcAft>
+                <a:spcPts val="400"/>
+              </a:spcAft>
+              <a:buClr>
+                <a:schemeClr val="accent1"/>
+              </a:buClr>
+              <a:buSzPct val="80000"/>
+              <a:buFont typeface="Corbel" pitchFamily="34" charset="0"/>
+              <a:buNone/>
+              <a:defRPr sz="1600" b="1" kern="1200">
+                <a:solidFill>
+                  <a:schemeClr val="accent1"/>
+                </a:solidFill>
+                <a:latin typeface="+mn-lt"/>
+                <a:ea typeface="+mn-ea"/>
+                <a:cs typeface="+mn-cs"/>
+              </a:defRPr>
+            </a:lvl6pPr>
+            <a:lvl7pPr marL="2743200" indent="0" algn="l" defTabSz="914400" rtl="0" eaLnBrk="1" latinLnBrk="0" hangingPunct="1">
+              <a:lnSpc>
+                <a:spcPct val="90000"/>
+              </a:lnSpc>
+              <a:spcBef>
+                <a:spcPts val="200"/>
+              </a:spcBef>
+              <a:spcAft>
+                <a:spcPts val="400"/>
+              </a:spcAft>
+              <a:buClr>
+                <a:schemeClr val="accent1"/>
+              </a:buClr>
+              <a:buSzPct val="80000"/>
+              <a:buFont typeface="Corbel" pitchFamily="34" charset="0"/>
+              <a:buNone/>
+              <a:defRPr sz="1600" b="1" kern="1200">
+                <a:solidFill>
+                  <a:schemeClr val="accent1"/>
+                </a:solidFill>
+                <a:latin typeface="+mn-lt"/>
+                <a:ea typeface="+mn-ea"/>
+                <a:cs typeface="+mn-cs"/>
+              </a:defRPr>
+            </a:lvl7pPr>
+            <a:lvl8pPr marL="3200400" indent="0" algn="l" defTabSz="914400" rtl="0" eaLnBrk="1" latinLnBrk="0" hangingPunct="1">
+              <a:lnSpc>
+                <a:spcPct val="90000"/>
+              </a:lnSpc>
+              <a:spcBef>
+                <a:spcPts val="200"/>
+              </a:spcBef>
+              <a:spcAft>
+                <a:spcPts val="400"/>
+              </a:spcAft>
+              <a:buClr>
+                <a:schemeClr val="accent1"/>
+              </a:buClr>
+              <a:buSzPct val="80000"/>
+              <a:buFont typeface="Corbel" pitchFamily="34" charset="0"/>
+              <a:buNone/>
+              <a:defRPr sz="1600" b="1" kern="1200">
+                <a:solidFill>
+                  <a:schemeClr val="accent1"/>
+                </a:solidFill>
+                <a:latin typeface="+mn-lt"/>
+                <a:ea typeface="+mn-ea"/>
+                <a:cs typeface="+mn-cs"/>
+              </a:defRPr>
+            </a:lvl8pPr>
+            <a:lvl9pPr marL="3657600" indent="0" algn="l" defTabSz="914400" rtl="0" eaLnBrk="1" latinLnBrk="0" hangingPunct="1">
+              <a:lnSpc>
+                <a:spcPct val="90000"/>
+              </a:lnSpc>
+              <a:spcBef>
+                <a:spcPts val="200"/>
+              </a:spcBef>
+              <a:spcAft>
+                <a:spcPts val="400"/>
+              </a:spcAft>
+              <a:buClr>
+                <a:schemeClr val="accent1"/>
+              </a:buClr>
+              <a:buSzPct val="80000"/>
+              <a:buFont typeface="Corbel" pitchFamily="34" charset="0"/>
+              <a:buNone/>
+              <a:defRPr sz="1600" b="1" kern="1200">
+                <a:solidFill>
+                  <a:schemeClr val="accent1"/>
+                </a:solidFill>
+                <a:latin typeface="+mn-lt"/>
+                <a:ea typeface="+mn-ea"/>
+                <a:cs typeface="+mn-cs"/>
+              </a:defRPr>
+            </a:lvl9pPr>
+          </a:lstStyle>
+          <a:p>
+            <a:r>
+              <a:rPr lang="de-DE" dirty="0" smtClean="0">
+                <a:solidFill>
+                  <a:schemeClr val="accent4">
+                    <a:lumMod val="75000"/>
+                  </a:schemeClr>
+                </a:solidFill>
+              </a:rPr>
+              <a:t>Text </a:t>
+            </a:r>
+            <a:r>
+              <a:rPr lang="de-DE" dirty="0" err="1" smtClean="0">
+                <a:solidFill>
+                  <a:schemeClr val="accent4">
+                    <a:lumMod val="75000"/>
+                  </a:schemeClr>
+                </a:solidFill>
+              </a:rPr>
+              <a:t>input</a:t>
+            </a:r>
+            <a:r>
+              <a:rPr lang="de-DE" dirty="0" smtClean="0">
+                <a:solidFill>
+                  <a:schemeClr val="accent4">
+                    <a:lumMod val="75000"/>
+                  </a:schemeClr>
+                </a:solidFill>
+              </a:rPr>
+              <a:t>, </a:t>
+            </a:r>
+            <a:r>
+              <a:rPr lang="de-DE" dirty="0" err="1" smtClean="0">
+                <a:solidFill>
+                  <a:schemeClr val="accent4">
+                    <a:lumMod val="75000"/>
+                  </a:schemeClr>
+                </a:solidFill>
+              </a:rPr>
+              <a:t>autocompletion</a:t>
+            </a:r>
+            <a:r>
+              <a:rPr lang="de-DE" dirty="0" smtClean="0">
+                <a:solidFill>
+                  <a:schemeClr val="accent4">
+                    <a:lumMod val="75000"/>
+                  </a:schemeClr>
+                </a:solidFill>
+              </a:rPr>
+              <a:t> </a:t>
+            </a:r>
+            <a:r>
+              <a:rPr lang="de-DE" dirty="0" err="1" smtClean="0">
+                <a:solidFill>
+                  <a:schemeClr val="accent4">
+                    <a:lumMod val="75000"/>
+                  </a:schemeClr>
+                </a:solidFill>
+              </a:rPr>
+              <a:t>and</a:t>
+            </a:r>
+            <a:r>
+              <a:rPr lang="de-DE" dirty="0" smtClean="0">
+                <a:solidFill>
+                  <a:schemeClr val="accent4">
+                    <a:lumMod val="75000"/>
+                  </a:schemeClr>
+                </a:solidFill>
+              </a:rPr>
+              <a:t> </a:t>
+            </a:r>
+            <a:r>
+              <a:rPr lang="de-DE" dirty="0" err="1" smtClean="0">
+                <a:solidFill>
+                  <a:schemeClr val="accent4">
+                    <a:lumMod val="75000"/>
+                  </a:schemeClr>
+                </a:solidFill>
+              </a:rPr>
+              <a:t>suggestions</a:t>
+            </a:r>
+            <a:r>
+              <a:rPr lang="de-DE" dirty="0" smtClean="0">
+                <a:solidFill>
+                  <a:schemeClr val="accent4">
+                    <a:lumMod val="75000"/>
+                  </a:schemeClr>
+                </a:solidFill>
+              </a:rPr>
+              <a:t> </a:t>
+            </a:r>
+            <a:r>
+              <a:rPr lang="de-DE" baseline="-25000" dirty="0" smtClean="0">
+                <a:solidFill>
+                  <a:schemeClr val="accent4">
+                    <a:lumMod val="75000"/>
+                  </a:schemeClr>
+                </a:solidFill>
+              </a:rPr>
+              <a:t>[CHANG2013]</a:t>
+            </a:r>
+            <a:endParaRPr lang="de-DE" baseline="-25000" dirty="0">
+              <a:solidFill>
+                <a:schemeClr val="accent4">
+                  <a:lumMod val="75000"/>
+                </a:schemeClr>
+              </a:solidFill>
+            </a:endParaRPr>
+          </a:p>
+        </p:txBody>
+      </p:sp>
     </p:spTree>
     <p:extLst>
       <p:ext uri="{BB962C8B-B14F-4D97-AF65-F5344CB8AC3E}">
-        <p14:creationId xmlns:p14="http://schemas.microsoft.com/office/powerpoint/2010/main" val="1597652902"/>
+        <p14:creationId xmlns:p14="http://schemas.microsoft.com/office/powerpoint/2010/main" val="3960564431"/>
       </p:ext>
     </p:extLst>
   </p:cSld>
@@ -3704,6 +4340,36 @@
           <a:chExt cx="0" cy="0"/>
         </a:xfrm>
       </p:grpSpPr>
+      <p:pic>
+        <p:nvPicPr>
+          <p:cNvPr id="8" name="Grafik 7"/>
+          <p:cNvPicPr>
+            <a:picLocks noChangeAspect="1"/>
+          </p:cNvPicPr>
+          <p:nvPr/>
+        </p:nvPicPr>
+        <p:blipFill>
+          <a:blip r:embed="rId2">
+            <a:extLst>
+              <a:ext uri="{28A0092B-C50C-407E-A947-70E740481C1C}">
+                <a14:useLocalDpi xmlns:a14="http://schemas.microsoft.com/office/drawing/2010/main" val="0"/>
+              </a:ext>
+            </a:extLst>
+          </a:blip>
+          <a:stretch>
+            <a:fillRect/>
+          </a:stretch>
+        </p:blipFill>
+        <p:spPr>
+          <a:xfrm>
+            <a:off x="5660941" y="1885375"/>
+            <a:ext cx="6102943" cy="2871975"/>
+          </a:xfrm>
+          <a:prstGeom prst="rect">
+            <a:avLst/>
+          </a:prstGeom>
+        </p:spPr>
+      </p:pic>
       <p:sp>
         <p:nvSpPr>
           <p:cNvPr id="2" name="Titel 1"/>
@@ -3719,7 +4385,19 @@
           <a:bodyPr/>
           <a:lstStyle/>
           <a:p>
-            <a:endParaRPr lang="de-DE"/>
+            <a:r>
+              <a:rPr lang="de-DE" dirty="0" smtClean="0"/>
+              <a:t>Mobile </a:t>
+            </a:r>
+            <a:r>
+              <a:rPr lang="de-DE" dirty="0" err="1" smtClean="0"/>
+              <a:t>Application</a:t>
+            </a:r>
+            <a:r>
+              <a:rPr lang="de-DE" dirty="0" smtClean="0"/>
+              <a:t> Design</a:t>
+            </a:r>
+            <a:endParaRPr lang="de-DE" dirty="0"/>
           </a:p>
         </p:txBody>
       </p:sp>
@@ -3743,6 +4421,195 @@
           <a:bodyPr/>
           <a:lstStyle/>
           <a:p>
+            <a:r>
+              <a:rPr lang="de-DE" dirty="0" smtClean="0">
+                <a:solidFill>
+                  <a:schemeClr val="accent4">
+                    <a:lumMod val="75000"/>
+                  </a:schemeClr>
+                </a:solidFill>
+              </a:rPr>
+              <a:t>Menu </a:t>
+            </a:r>
+            <a:r>
+              <a:rPr lang="de-DE" dirty="0" err="1" smtClean="0">
+                <a:solidFill>
+                  <a:schemeClr val="accent4">
+                    <a:lumMod val="75000"/>
+                  </a:schemeClr>
+                </a:solidFill>
+              </a:rPr>
+              <a:t>conventions</a:t>
+            </a:r>
+            <a:endParaRPr lang="de-DE" baseline="-25000" dirty="0">
+              <a:solidFill>
+                <a:schemeClr val="accent4">
+                  <a:lumMod val="75000"/>
+                </a:schemeClr>
+              </a:solidFill>
+            </a:endParaRPr>
+          </a:p>
+        </p:txBody>
+      </p:sp>
+      <p:sp>
+        <p:nvSpPr>
+          <p:cNvPr id="4" name="Inhaltsplatzhalter 3"/>
+          <p:cNvSpPr>
+            <a:spLocks noGrp="1"/>
+          </p:cNvSpPr>
+          <p:nvPr>
+            <p:ph sz="half" idx="2"/>
+          </p:nvPr>
+        </p:nvSpPr>
+        <p:spPr>
+          <a:xfrm>
+            <a:off x="1143000" y="2721483"/>
+            <a:ext cx="5208374" cy="1332000"/>
+          </a:xfrm>
+        </p:spPr>
+        <p:txBody>
+          <a:bodyPr/>
+          <a:lstStyle/>
+          <a:p>
+            <a:r>
+              <a:rPr lang="de-DE" dirty="0" smtClean="0"/>
+              <a:t>Hamburger vs. Pizza vs. Sushi etc. </a:t>
+            </a:r>
+            <a:r>
+              <a:rPr lang="de-DE" baseline="-25000" dirty="0" smtClean="0"/>
+              <a:t>[NIELSEN2015</a:t>
+            </a:r>
+            <a:r>
+              <a:rPr lang="de-DE" baseline="-25000" dirty="0"/>
+              <a:t>, </a:t>
+            </a:r>
+            <a:r>
+              <a:rPr lang="de-DE" baseline="-25000" dirty="0" smtClean="0"/>
+              <a:t>TSIODOULOS2016</a:t>
+            </a:r>
+            <a:r>
+              <a:rPr lang="de-DE" baseline="-25000" dirty="0"/>
+              <a:t>, JONES2016, HOPKINS1988, ZIEFLE2006]</a:t>
+            </a:r>
+            <a:r>
+              <a:rPr lang="de-DE" dirty="0" smtClean="0"/>
+              <a:t/>
+            </a:r>
+            <a:br>
+              <a:rPr lang="de-DE" dirty="0" smtClean="0"/>
+            </a:br>
+            <a:endParaRPr lang="de-DE" dirty="0"/>
+          </a:p>
+        </p:txBody>
+      </p:sp>
+      <p:pic>
+        <p:nvPicPr>
+          <p:cNvPr id="7" name="Picture 2" descr="https://d30y9cdsu7xlg0.cloudfront.net/png/34626-200.png"/>
+          <p:cNvPicPr>
+            <a:picLocks noChangeAspect="1" noChangeArrowheads="1"/>
+          </p:cNvPicPr>
+          <p:nvPr/>
+        </p:nvPicPr>
+        <p:blipFill>
+          <a:blip r:embed="rId3">
+            <a:duotone>
+              <a:schemeClr val="accent1">
+                <a:shade val="45000"/>
+                <a:satMod val="135000"/>
+              </a:schemeClr>
+              <a:prstClr val="white"/>
+            </a:duotone>
+            <a:extLst>
+              <a:ext uri="{28A0092B-C50C-407E-A947-70E740481C1C}">
+                <a14:useLocalDpi xmlns:a14="http://schemas.microsoft.com/office/drawing/2010/main" val="0"/>
+              </a:ext>
+            </a:extLst>
+          </a:blip>
+          <a:srcRect/>
+          <a:stretch>
+            <a:fillRect/>
+          </a:stretch>
+        </p:blipFill>
+        <p:spPr bwMode="auto">
+          <a:xfrm>
+            <a:off x="10294620" y="4901035"/>
+            <a:ext cx="1620000" cy="1620000"/>
+          </a:xfrm>
+          <a:prstGeom prst="rect">
+            <a:avLst/>
+          </a:prstGeom>
+          <a:noFill/>
+          <a:extLst>
+            <a:ext uri="{909E8E84-426E-40DD-AFC4-6F175D3DCCD1}">
+              <a14:hiddenFill xmlns:a14="http://schemas.microsoft.com/office/drawing/2010/main">
+                <a:solidFill>
+                  <a:srgbClr val="FFFFFF"/>
+                </a:solidFill>
+              </a14:hiddenFill>
+            </a:ext>
+          </a:extLst>
+        </p:spPr>
+      </p:pic>
+      <p:sp>
+        <p:nvSpPr>
+          <p:cNvPr id="11" name="Textplatzhalter 4"/>
+          <p:cNvSpPr>
+            <a:spLocks noGrp="1"/>
+          </p:cNvSpPr>
+          <p:nvPr>
+            <p:ph type="body" sz="quarter" idx="3"/>
+          </p:nvPr>
+        </p:nvSpPr>
+        <p:spPr>
+          <a:xfrm>
+            <a:off x="1143000" y="3678763"/>
+            <a:ext cx="7296150" cy="756000"/>
+          </a:xfrm>
+        </p:spPr>
+        <p:txBody>
+          <a:bodyPr/>
+          <a:lstStyle/>
+          <a:p>
+            <a:r>
+              <a:rPr lang="de-DE" dirty="0" smtClean="0">
+                <a:solidFill>
+                  <a:schemeClr val="accent4">
+                    <a:lumMod val="75000"/>
+                  </a:schemeClr>
+                </a:solidFill>
+              </a:rPr>
+              <a:t>Limited </a:t>
+            </a:r>
+            <a:r>
+              <a:rPr lang="de-DE" dirty="0" err="1" smtClean="0">
+                <a:solidFill>
+                  <a:schemeClr val="accent4">
+                    <a:lumMod val="75000"/>
+                  </a:schemeClr>
+                </a:solidFill>
+              </a:rPr>
+              <a:t>screen</a:t>
+            </a:r>
+            <a:r>
+              <a:rPr lang="de-DE" dirty="0" smtClean="0">
+                <a:solidFill>
+                  <a:schemeClr val="accent4">
+                    <a:lumMod val="75000"/>
+                  </a:schemeClr>
+                </a:solidFill>
+              </a:rPr>
+              <a:t> real </a:t>
+            </a:r>
+            <a:r>
+              <a:rPr lang="de-DE" dirty="0" err="1" smtClean="0">
+                <a:solidFill>
+                  <a:schemeClr val="accent4">
+                    <a:lumMod val="75000"/>
+                  </a:schemeClr>
+                </a:solidFill>
+              </a:rPr>
+              <a:t>estate</a:t>
+            </a:r>
             <a:endParaRPr lang="de-DE" dirty="0">
               <a:solidFill>
                 <a:schemeClr val="accent4">
@@ -3755,6 +4622,256 @@
       </p:sp>
       <p:sp>
         <p:nvSpPr>
+          <p:cNvPr id="12" name="Inhaltsplatzhalter 5"/>
+          <p:cNvSpPr>
+            <a:spLocks noGrp="1"/>
+          </p:cNvSpPr>
+          <p:nvPr>
+            <p:ph sz="quarter" idx="4"/>
+          </p:nvPr>
+        </p:nvSpPr>
+        <p:spPr>
+          <a:xfrm>
+            <a:off x="1143000" y="4398733"/>
+            <a:ext cx="8210550" cy="1332000"/>
+          </a:xfrm>
+        </p:spPr>
+        <p:txBody>
+          <a:bodyPr>
+            <a:normAutofit lnSpcReduction="10000"/>
+          </a:bodyPr>
+          <a:lstStyle/>
+          <a:p>
+            <a:r>
+              <a:rPr lang="de-DE" dirty="0"/>
+              <a:t>Fisheye </a:t>
+            </a:r>
+            <a:r>
+              <a:rPr lang="de-DE" baseline="-25000" dirty="0"/>
+              <a:t>[</a:t>
+            </a:r>
+            <a:r>
+              <a:rPr lang="de-DE" baseline="-25000" dirty="0" smtClean="0"/>
+              <a:t>BEDERSON2004]</a:t>
+            </a:r>
+            <a:endParaRPr lang="de-DE" baseline="-25000" dirty="0"/>
+          </a:p>
+          <a:p>
+            <a:r>
+              <a:rPr lang="de-DE" dirty="0" err="1" smtClean="0"/>
+              <a:t>PeepholeDisplays</a:t>
+            </a:r>
+            <a:r>
+              <a:rPr lang="de-DE" dirty="0" smtClean="0"/>
+              <a:t> </a:t>
+            </a:r>
+            <a:r>
+              <a:rPr lang="de-DE" baseline="-25000" dirty="0" smtClean="0"/>
+              <a:t>[YEE2003]</a:t>
+            </a:r>
+          </a:p>
+          <a:p>
+            <a:r>
+              <a:rPr lang="de-DE" dirty="0" err="1" smtClean="0"/>
+              <a:t>SideSight</a:t>
+            </a:r>
+            <a:r>
+              <a:rPr lang="de-DE" dirty="0"/>
+              <a:t> </a:t>
+            </a:r>
+            <a:r>
+              <a:rPr lang="de-DE" baseline="-25000" dirty="0"/>
+              <a:t>[</a:t>
+            </a:r>
+            <a:r>
+              <a:rPr lang="de-DE" baseline="-25000" dirty="0" smtClean="0"/>
+              <a:t>BUTLER2008]</a:t>
+            </a:r>
+          </a:p>
+          <a:p>
+            <a:endParaRPr lang="de-DE" dirty="0"/>
+          </a:p>
+        </p:txBody>
+      </p:sp>
+    </p:spTree>
+    <p:extLst>
+      <p:ext uri="{BB962C8B-B14F-4D97-AF65-F5344CB8AC3E}">
+        <p14:creationId xmlns:p14="http://schemas.microsoft.com/office/powerpoint/2010/main" val="1203594369"/>
+      </p:ext>
+    </p:extLst>
+  </p:cSld>
+  <p:clrMapOvr>
+    <a:masterClrMapping/>
+  </p:clrMapOvr>
+</p:sld>
+</file>
+
+<file path=ppt/slides/slide4.xml><?xml version="1.0" encoding="utf-8"?>
+<p:sld xmlns:a="http://schemas.openxmlformats.org/drawingml/2006/main" xmlns:r="http://schemas.openxmlformats.org/officeDocument/2006/relationships" xmlns:p="http://schemas.openxmlformats.org/presentationml/2006/main">
+  <p:cSld>
+    <p:spTree>
+      <p:nvGrpSpPr>
+        <p:cNvPr id="1" name=""/>
+        <p:cNvGrpSpPr/>
+        <p:nvPr/>
+      </p:nvGrpSpPr>
+      <p:grpSpPr>
+        <a:xfrm>
+          <a:off x="0" y="0"/>
+          <a:ext cx="0" cy="0"/>
+          <a:chOff x="0" y="0"/>
+          <a:chExt cx="0" cy="0"/>
+        </a:xfrm>
+      </p:grpSpPr>
+      <p:sp>
+        <p:nvSpPr>
+          <p:cNvPr id="2" name="Titel 1"/>
+          <p:cNvSpPr>
+            <a:spLocks noGrp="1"/>
+          </p:cNvSpPr>
+          <p:nvPr>
+            <p:ph type="title"/>
+          </p:nvPr>
+        </p:nvSpPr>
+        <p:spPr/>
+        <p:txBody>
+          <a:bodyPr>
+            <a:normAutofit/>
+          </a:bodyPr>
+          <a:lstStyle/>
+          <a:p>
+            <a:r>
+              <a:rPr lang="de-DE" dirty="0" smtClean="0"/>
+              <a:t>Interaction </a:t>
+            </a:r>
+            <a:r>
+              <a:rPr lang="de-DE" dirty="0" err="1" smtClean="0"/>
+              <a:t>for</a:t>
+            </a:r>
+            <a:r>
+              <a:rPr lang="de-DE" dirty="0" smtClean="0"/>
+              <a:t> expert </a:t>
+            </a:r>
+            <a:r>
+              <a:rPr lang="de-DE" dirty="0" err="1" smtClean="0"/>
+              <a:t>users</a:t>
+            </a:r>
+            <a:r>
+              <a:rPr lang="de-DE" dirty="0" smtClean="0"/>
+              <a:t> </a:t>
+            </a:r>
+            <a:r>
+              <a:rPr lang="de-DE" sz="2400" baseline="-25000" dirty="0" smtClean="0"/>
+              <a:t>(</a:t>
+            </a:r>
+            <a:r>
+              <a:rPr lang="de-DE" sz="2400" baseline="-25000" dirty="0" err="1"/>
+              <a:t>see</a:t>
+            </a:r>
+            <a:r>
+              <a:rPr lang="de-DE" sz="2400" baseline="-25000" dirty="0"/>
+              <a:t> [NIELSEN1995, NORMAN2013</a:t>
+            </a:r>
+            <a:r>
+              <a:rPr lang="de-DE" sz="2400" baseline="-25000" dirty="0" smtClean="0"/>
+              <a:t>])</a:t>
+            </a:r>
+            <a:endParaRPr lang="de-DE" dirty="0"/>
+          </a:p>
+        </p:txBody>
+      </p:sp>
+      <p:sp>
+        <p:nvSpPr>
+          <p:cNvPr id="3" name="Textplatzhalter 2"/>
+          <p:cNvSpPr>
+            <a:spLocks noGrp="1"/>
+          </p:cNvSpPr>
+          <p:nvPr>
+            <p:ph type="body" idx="1"/>
+          </p:nvPr>
+        </p:nvSpPr>
+        <p:spPr>
+          <a:xfrm>
+            <a:off x="1142999" y="2001511"/>
+            <a:ext cx="9063681" cy="756000"/>
+          </a:xfrm>
+        </p:spPr>
+        <p:txBody>
+          <a:bodyPr/>
+          <a:lstStyle/>
+          <a:p>
+            <a:r>
+              <a:rPr lang="de-DE" dirty="0" smtClean="0">
+                <a:solidFill>
+                  <a:schemeClr val="accent4">
+                    <a:lumMod val="75000"/>
+                  </a:schemeClr>
+                </a:solidFill>
+              </a:rPr>
+              <a:t>In </a:t>
+            </a:r>
+            <a:r>
+              <a:rPr lang="de-DE" dirty="0" err="1" smtClean="0">
+                <a:solidFill>
+                  <a:schemeClr val="accent4">
+                    <a:lumMod val="75000"/>
+                  </a:schemeClr>
+                </a:solidFill>
+              </a:rPr>
+              <a:t>hierarchical</a:t>
+            </a:r>
+            <a:r>
+              <a:rPr lang="de-DE" dirty="0" smtClean="0">
+                <a:solidFill>
+                  <a:schemeClr val="accent4">
+                    <a:lumMod val="75000"/>
+                  </a:schemeClr>
+                </a:solidFill>
+              </a:rPr>
+              <a:t> </a:t>
+            </a:r>
+            <a:r>
+              <a:rPr lang="de-DE" dirty="0" err="1" smtClean="0">
+                <a:solidFill>
+                  <a:schemeClr val="accent4">
+                    <a:lumMod val="75000"/>
+                  </a:schemeClr>
+                </a:solidFill>
+              </a:rPr>
+              <a:t>menu</a:t>
+            </a:r>
+            <a:r>
+              <a:rPr lang="de-DE" dirty="0" smtClean="0">
+                <a:solidFill>
+                  <a:schemeClr val="accent4">
+                    <a:lumMod val="75000"/>
+                  </a:schemeClr>
+                </a:solidFill>
+              </a:rPr>
+              <a:t> </a:t>
+            </a:r>
+            <a:r>
+              <a:rPr lang="de-DE" dirty="0" err="1" smtClean="0">
+                <a:solidFill>
+                  <a:schemeClr val="accent4">
+                    <a:lumMod val="75000"/>
+                  </a:schemeClr>
+                </a:solidFill>
+              </a:rPr>
+              <a:t>structures</a:t>
+            </a:r>
+            <a:endParaRPr lang="de-DE" baseline="-25000" dirty="0">
+              <a:solidFill>
+                <a:schemeClr val="accent4">
+                  <a:lumMod val="75000"/>
+                </a:schemeClr>
+              </a:solidFill>
+            </a:endParaRPr>
+          </a:p>
+        </p:txBody>
+      </p:sp>
+      <p:sp>
+        <p:nvSpPr>
           <p:cNvPr id="4" name="Inhaltsplatzhalter 3"/>
           <p:cNvSpPr>
             <a:spLocks noGrp="1"/>
@@ -3773,7 +4890,27 @@
           <a:bodyPr/>
           <a:lstStyle/>
           <a:p>
-            <a:endParaRPr lang="de-DE" dirty="0"/>
+            <a:r>
+              <a:rPr lang="de-DE" dirty="0" err="1" smtClean="0"/>
+              <a:t>Marking</a:t>
+            </a:r>
+            <a:r>
+              <a:rPr lang="de-DE" dirty="0" smtClean="0"/>
+              <a:t> </a:t>
+            </a:r>
+            <a:r>
+              <a:rPr lang="de-DE" dirty="0"/>
+              <a:t>Menus </a:t>
+            </a:r>
+            <a:r>
+              <a:rPr lang="de-DE" baseline="-25000" dirty="0"/>
+              <a:t>[</a:t>
+            </a:r>
+            <a:r>
+              <a:rPr lang="de-DE" baseline="-25000" dirty="0" smtClean="0"/>
+              <a:t>KURTENBACH1993, KIN2011]</a:t>
+            </a:r>
+            <a:endParaRPr lang="de-DE" baseline="-25000" dirty="0"/>
           </a:p>
         </p:txBody>
       </p:sp>
@@ -3789,7 +4926,7 @@
         </p:nvSpPr>
         <p:spPr>
           <a:xfrm>
-            <a:off x="1143000" y="4395455"/>
+            <a:off x="1143000" y="3456341"/>
             <a:ext cx="7296150" cy="756000"/>
           </a:xfrm>
         </p:spPr>
@@ -3797,6 +4934,26 @@
           <a:bodyPr/>
           <a:lstStyle/>
           <a:p>
+            <a:r>
+              <a:rPr lang="de-DE" dirty="0" smtClean="0">
+                <a:solidFill>
+                  <a:schemeClr val="accent4">
+                    <a:lumMod val="75000"/>
+                  </a:schemeClr>
+                </a:solidFill>
+              </a:rPr>
+              <a:t>Shortcuts / </a:t>
+            </a:r>
+            <a:r>
+              <a:rPr lang="de-DE" dirty="0" err="1" smtClean="0">
+                <a:solidFill>
+                  <a:schemeClr val="accent4">
+                    <a:lumMod val="75000"/>
+                  </a:schemeClr>
+                </a:solidFill>
+              </a:rPr>
+              <a:t>Hotkeys</a:t>
+            </a:r>
             <a:endParaRPr lang="de-DE" dirty="0">
               <a:solidFill>
                 <a:schemeClr val="accent4">
@@ -3819,15 +4976,29 @@
         </p:nvSpPr>
         <p:spPr>
           <a:xfrm>
-            <a:off x="1143000" y="5115425"/>
+            <a:off x="1143000" y="4176311"/>
             <a:ext cx="8210550" cy="1332000"/>
           </a:xfrm>
         </p:spPr>
         <p:txBody>
-          <a:bodyPr/>
+          <a:bodyPr>
+            <a:normAutofit/>
+          </a:bodyPr>
           <a:lstStyle/>
           <a:p>
-            <a:endParaRPr lang="de-DE" dirty="0"/>
+            <a:r>
+              <a:rPr lang="de-DE" dirty="0" err="1" smtClean="0"/>
+              <a:t>ExposeHK</a:t>
+            </a:r>
+            <a:r>
+              <a:rPr lang="de-DE" dirty="0" smtClean="0"/>
+              <a:t> </a:t>
+            </a:r>
+            <a:r>
+              <a:rPr lang="de-DE" baseline="-25000" dirty="0"/>
+              <a:t>[MALACRIA2013]</a:t>
+            </a:r>
+            <a:endParaRPr lang="de-DE" baseline="-25000" dirty="0"/>
           </a:p>
         </p:txBody>
       </p:sp>
@@ -3882,7 +5053,2315 @@
     </p:spTree>
     <p:extLst>
       <p:ext uri="{BB962C8B-B14F-4D97-AF65-F5344CB8AC3E}">
+        <p14:creationId xmlns:p14="http://schemas.microsoft.com/office/powerpoint/2010/main" val="642235801"/>
+      </p:ext>
+    </p:extLst>
+  </p:cSld>
+  <p:clrMapOvr>
+    <a:masterClrMapping/>
+  </p:clrMapOvr>
+</p:sld>
+</file>
+
+<file path=ppt/slides/slide5.xml><?xml version="1.0" encoding="utf-8"?>
+<p:sld xmlns:a="http://schemas.openxmlformats.org/drawingml/2006/main" xmlns:r="http://schemas.openxmlformats.org/officeDocument/2006/relationships" xmlns:p="http://schemas.openxmlformats.org/presentationml/2006/main">
+  <p:cSld>
+    <p:spTree>
+      <p:nvGrpSpPr>
+        <p:cNvPr id="1" name=""/>
+        <p:cNvGrpSpPr/>
+        <p:nvPr/>
+      </p:nvGrpSpPr>
+      <p:grpSpPr>
+        <a:xfrm>
+          <a:off x="0" y="0"/>
+          <a:ext cx="0" cy="0"/>
+          <a:chOff x="0" y="0"/>
+          <a:chExt cx="0" cy="0"/>
+        </a:xfrm>
+      </p:grpSpPr>
+      <p:sp>
+        <p:nvSpPr>
+          <p:cNvPr id="2" name="Titel 1"/>
+          <p:cNvSpPr>
+            <a:spLocks noGrp="1"/>
+          </p:cNvSpPr>
+          <p:nvPr>
+            <p:ph type="title"/>
+          </p:nvPr>
+        </p:nvSpPr>
+        <p:spPr/>
+        <p:txBody>
+          <a:bodyPr/>
+          <a:lstStyle/>
+          <a:p>
+            <a:r>
+              <a:rPr lang="de-DE" dirty="0" smtClean="0"/>
+              <a:t>UCD </a:t>
+            </a:r>
+            <a:r>
+              <a:rPr lang="de-DE" dirty="0" err="1" smtClean="0"/>
+              <a:t>methodology</a:t>
+            </a:r>
+            <a:endParaRPr lang="de-DE" dirty="0"/>
+          </a:p>
+        </p:txBody>
+      </p:sp>
+      <p:sp>
+        <p:nvSpPr>
+          <p:cNvPr id="3" name="Textplatzhalter 2"/>
+          <p:cNvSpPr>
+            <a:spLocks noGrp="1"/>
+          </p:cNvSpPr>
+          <p:nvPr>
+            <p:ph type="body" idx="1"/>
+          </p:nvPr>
+        </p:nvSpPr>
+        <p:spPr>
+          <a:xfrm>
+            <a:off x="1143000" y="2001511"/>
+            <a:ext cx="7296150" cy="756000"/>
+          </a:xfrm>
+        </p:spPr>
+        <p:txBody>
+          <a:bodyPr/>
+          <a:lstStyle/>
+          <a:p>
+            <a:r>
+              <a:rPr lang="de-DE" dirty="0" smtClean="0">
+                <a:solidFill>
+                  <a:schemeClr val="accent4">
+                    <a:lumMod val="75000"/>
+                  </a:schemeClr>
+                </a:solidFill>
+              </a:rPr>
+              <a:t>Double </a:t>
+            </a:r>
+            <a:r>
+              <a:rPr lang="de-DE" dirty="0">
+                <a:solidFill>
+                  <a:schemeClr val="accent4">
+                    <a:lumMod val="75000"/>
+                  </a:schemeClr>
+                </a:solidFill>
+              </a:rPr>
+              <a:t>Diamond </a:t>
+            </a:r>
+            <a:r>
+              <a:rPr lang="de-DE" dirty="0" err="1" smtClean="0">
+                <a:solidFill>
+                  <a:schemeClr val="accent4">
+                    <a:lumMod val="75000"/>
+                  </a:schemeClr>
+                </a:solidFill>
+              </a:rPr>
+              <a:t>Process</a:t>
+            </a:r>
+            <a:r>
+              <a:rPr lang="de-DE" dirty="0" smtClean="0">
+                <a:solidFill>
+                  <a:schemeClr val="accent4">
+                    <a:lumMod val="75000"/>
+                  </a:schemeClr>
+                </a:solidFill>
+              </a:rPr>
+              <a:t> </a:t>
+            </a:r>
+            <a:r>
+              <a:rPr lang="de-DE" baseline="-25000" dirty="0" smtClean="0">
+                <a:solidFill>
+                  <a:schemeClr val="accent4">
+                    <a:lumMod val="75000"/>
+                  </a:schemeClr>
+                </a:solidFill>
+              </a:rPr>
+              <a:t>[</a:t>
+            </a:r>
+            <a:r>
+              <a:rPr lang="de-DE" baseline="-25000" dirty="0">
+                <a:solidFill>
+                  <a:schemeClr val="accent4">
+                    <a:lumMod val="75000"/>
+                  </a:schemeClr>
+                </a:solidFill>
+              </a:rPr>
+              <a:t>NORMAN2013, DESIGNCOUNCIL2006]</a:t>
+            </a:r>
+            <a:endParaRPr lang="de-DE" baseline="-25000" dirty="0">
+              <a:solidFill>
+                <a:schemeClr val="accent4">
+                  <a:lumMod val="75000"/>
+                </a:schemeClr>
+              </a:solidFill>
+            </a:endParaRPr>
+          </a:p>
+        </p:txBody>
+      </p:sp>
+      <p:sp>
+        <p:nvSpPr>
+          <p:cNvPr id="4" name="Inhaltsplatzhalter 3"/>
+          <p:cNvSpPr>
+            <a:spLocks noGrp="1"/>
+          </p:cNvSpPr>
+          <p:nvPr>
+            <p:ph sz="half" idx="2"/>
+          </p:nvPr>
+        </p:nvSpPr>
+        <p:spPr>
+          <a:xfrm>
+            <a:off x="1143000" y="2721483"/>
+            <a:ext cx="8210550" cy="1332000"/>
+          </a:xfrm>
+        </p:spPr>
+        <p:txBody>
+          <a:bodyPr/>
+          <a:lstStyle/>
+          <a:p>
+            <a:r>
+              <a:rPr lang="de-DE" i="1" dirty="0" smtClean="0"/>
+              <a:t>Problem </a:t>
+            </a:r>
+            <a:r>
+              <a:rPr lang="de-DE" i="1" dirty="0" err="1" smtClean="0"/>
+              <a:t>definition</a:t>
+            </a:r>
+            <a:r>
+              <a:rPr lang="de-DE" i="1" dirty="0" smtClean="0"/>
+              <a:t> </a:t>
+            </a:r>
+            <a:r>
+              <a:rPr lang="de-DE" dirty="0" err="1" smtClean="0"/>
+              <a:t>and</a:t>
+            </a:r>
+            <a:r>
+              <a:rPr lang="de-DE" dirty="0" smtClean="0"/>
+              <a:t> </a:t>
+            </a:r>
+            <a:r>
+              <a:rPr lang="de-DE" i="1" dirty="0" smtClean="0"/>
+              <a:t>design </a:t>
+            </a:r>
+            <a:r>
+              <a:rPr lang="de-DE" i="1" dirty="0" err="1" smtClean="0"/>
+              <a:t>brief</a:t>
+            </a:r>
+            <a:r>
+              <a:rPr lang="de-DE" i="1" dirty="0" smtClean="0"/>
+              <a:t> </a:t>
+            </a:r>
+            <a:r>
+              <a:rPr lang="de-DE" dirty="0" err="1" smtClean="0"/>
+              <a:t>by</a:t>
+            </a:r>
+            <a:r>
+              <a:rPr lang="de-DE" dirty="0" smtClean="0"/>
+              <a:t> </a:t>
+            </a:r>
+            <a:r>
+              <a:rPr lang="de-DE" dirty="0" err="1" smtClean="0"/>
+              <a:t>beginning</a:t>
+            </a:r>
+            <a:r>
+              <a:rPr lang="de-DE" dirty="0" smtClean="0"/>
+              <a:t> </a:t>
+            </a:r>
+            <a:r>
+              <a:rPr lang="de-DE" dirty="0" err="1" smtClean="0"/>
+              <a:t>of</a:t>
+            </a:r>
+            <a:r>
+              <a:rPr lang="de-DE" dirty="0" smtClean="0"/>
+              <a:t> </a:t>
+            </a:r>
+            <a:r>
+              <a:rPr lang="de-DE" dirty="0" err="1" smtClean="0"/>
+              <a:t>December</a:t>
+            </a:r>
+            <a:endParaRPr lang="de-DE" dirty="0"/>
+          </a:p>
+        </p:txBody>
+      </p:sp>
+      <p:sp>
+        <p:nvSpPr>
+          <p:cNvPr id="5" name="Textplatzhalter 4"/>
+          <p:cNvSpPr>
+            <a:spLocks noGrp="1"/>
+          </p:cNvSpPr>
+          <p:nvPr>
+            <p:ph type="body" sz="quarter" idx="3"/>
+          </p:nvPr>
+        </p:nvSpPr>
+        <p:spPr>
+          <a:xfrm>
+            <a:off x="1143000" y="3382201"/>
+            <a:ext cx="7296150" cy="756000"/>
+          </a:xfrm>
+        </p:spPr>
+        <p:txBody>
+          <a:bodyPr/>
+          <a:lstStyle/>
+          <a:p>
+            <a:r>
+              <a:rPr lang="de-DE" dirty="0" err="1" smtClean="0">
+                <a:solidFill>
+                  <a:schemeClr val="accent4">
+                    <a:lumMod val="75000"/>
+                  </a:schemeClr>
+                </a:solidFill>
+              </a:rPr>
+              <a:t>Using</a:t>
+            </a:r>
+            <a:r>
+              <a:rPr lang="de-DE" dirty="0" smtClean="0">
+                <a:solidFill>
+                  <a:schemeClr val="accent4">
+                    <a:lumMod val="75000"/>
+                  </a:schemeClr>
+                </a:solidFill>
+              </a:rPr>
+              <a:t> IDEO </a:t>
+            </a:r>
+            <a:r>
+              <a:rPr lang="de-DE" dirty="0" err="1" smtClean="0">
+                <a:solidFill>
+                  <a:schemeClr val="accent4">
+                    <a:lumMod val="75000"/>
+                  </a:schemeClr>
+                </a:solidFill>
+              </a:rPr>
+              <a:t>method</a:t>
+            </a:r>
+            <a:r>
+              <a:rPr lang="de-DE" dirty="0" smtClean="0">
+                <a:solidFill>
+                  <a:schemeClr val="accent4">
+                    <a:lumMod val="75000"/>
+                  </a:schemeClr>
+                </a:solidFill>
+              </a:rPr>
+              <a:t> </a:t>
+            </a:r>
+            <a:r>
+              <a:rPr lang="de-DE" dirty="0" err="1" smtClean="0">
+                <a:solidFill>
+                  <a:schemeClr val="accent4">
+                    <a:lumMod val="75000"/>
+                  </a:schemeClr>
+                </a:solidFill>
+              </a:rPr>
+              <a:t>cards</a:t>
+            </a:r>
+            <a:r>
+              <a:rPr lang="de-DE" baseline="-25000" dirty="0">
+                <a:solidFill>
+                  <a:schemeClr val="accent4">
+                    <a:lumMod val="75000"/>
+                  </a:schemeClr>
+                </a:solidFill>
+              </a:rPr>
+              <a:t> [</a:t>
+            </a:r>
+            <a:r>
+              <a:rPr lang="de-DE" baseline="-25000" dirty="0" smtClean="0">
+                <a:solidFill>
+                  <a:schemeClr val="accent4">
+                    <a:lumMod val="75000"/>
+                  </a:schemeClr>
+                </a:solidFill>
+              </a:rPr>
+              <a:t>IDEO2003]</a:t>
+            </a:r>
+            <a:endParaRPr lang="de-DE" baseline="-25000" dirty="0">
+              <a:solidFill>
+                <a:schemeClr val="accent4">
+                  <a:lumMod val="75000"/>
+                </a:schemeClr>
+              </a:solidFill>
+            </a:endParaRPr>
+          </a:p>
+        </p:txBody>
+      </p:sp>
+      <p:sp>
+        <p:nvSpPr>
+          <p:cNvPr id="6" name="Inhaltsplatzhalter 5"/>
+          <p:cNvSpPr>
+            <a:spLocks noGrp="1"/>
+          </p:cNvSpPr>
+          <p:nvPr>
+            <p:ph sz="quarter" idx="4"/>
+          </p:nvPr>
+        </p:nvSpPr>
+        <p:spPr>
+          <a:xfrm>
+            <a:off x="1143000" y="4102171"/>
+            <a:ext cx="8210550" cy="1332000"/>
+          </a:xfrm>
+        </p:spPr>
+        <p:txBody>
+          <a:bodyPr/>
+          <a:lstStyle/>
+          <a:p>
+            <a:r>
+              <a:rPr lang="de-DE" dirty="0" err="1" smtClean="0"/>
+              <a:t>And</a:t>
+            </a:r>
+            <a:r>
+              <a:rPr lang="de-DE" dirty="0" smtClean="0"/>
+              <a:t> </a:t>
+            </a:r>
+            <a:r>
+              <a:rPr lang="de-DE" dirty="0" err="1" smtClean="0"/>
+              <a:t>some</a:t>
+            </a:r>
+            <a:r>
+              <a:rPr lang="de-DE" dirty="0" smtClean="0"/>
+              <a:t> additional </a:t>
+            </a:r>
+            <a:r>
+              <a:rPr lang="de-DE" dirty="0" err="1" smtClean="0"/>
+              <a:t>resources</a:t>
+            </a:r>
+            <a:r>
+              <a:rPr lang="de-DE" dirty="0" smtClean="0"/>
+              <a:t> </a:t>
+            </a:r>
+            <a:r>
+              <a:rPr lang="de-DE" baseline="-25000" dirty="0" smtClean="0"/>
+              <a:t>e.g</a:t>
+            </a:r>
+            <a:r>
+              <a:rPr lang="de-DE" baseline="-25000" dirty="0"/>
+              <a:t>. </a:t>
+            </a:r>
+            <a:r>
+              <a:rPr lang="de-DE" baseline="-25000" dirty="0" smtClean="0"/>
+              <a:t>[</a:t>
+            </a:r>
+            <a:r>
+              <a:rPr lang="de-DE" baseline="-25000" dirty="0"/>
+              <a:t>ILAMA2015 </a:t>
+            </a:r>
+            <a:r>
+              <a:rPr lang="de-DE" baseline="-25000" dirty="0" smtClean="0"/>
+              <a:t>, SAFFER2010]</a:t>
+            </a:r>
+            <a:endParaRPr lang="de-DE" baseline="-25000" dirty="0"/>
+          </a:p>
+        </p:txBody>
+      </p:sp>
+      <p:pic>
+        <p:nvPicPr>
+          <p:cNvPr id="7" name="Picture 2" descr="https://d30y9cdsu7xlg0.cloudfront.net/png/34626-200.png"/>
+          <p:cNvPicPr>
+            <a:picLocks noChangeAspect="1" noChangeArrowheads="1"/>
+          </p:cNvPicPr>
+          <p:nvPr/>
+        </p:nvPicPr>
+        <p:blipFill>
+          <a:blip r:embed="rId2">
+            <a:duotone>
+              <a:schemeClr val="accent1">
+                <a:shade val="45000"/>
+                <a:satMod val="135000"/>
+              </a:schemeClr>
+              <a:prstClr val="white"/>
+            </a:duotone>
+            <a:extLst>
+              <a:ext uri="{28A0092B-C50C-407E-A947-70E740481C1C}">
+                <a14:useLocalDpi xmlns:a14="http://schemas.microsoft.com/office/drawing/2010/main" val="0"/>
+              </a:ext>
+            </a:extLst>
+          </a:blip>
+          <a:srcRect/>
+          <a:stretch>
+            <a:fillRect/>
+          </a:stretch>
+        </p:blipFill>
+        <p:spPr bwMode="auto">
+          <a:xfrm>
+            <a:off x="10294620" y="4901035"/>
+            <a:ext cx="1620000" cy="1620000"/>
+          </a:xfrm>
+          <a:prstGeom prst="rect">
+            <a:avLst/>
+          </a:prstGeom>
+          <a:noFill/>
+          <a:extLst>
+            <a:ext uri="{909E8E84-426E-40DD-AFC4-6F175D3DCCD1}">
+              <a14:hiddenFill xmlns:a14="http://schemas.microsoft.com/office/drawing/2010/main">
+                <a:solidFill>
+                  <a:srgbClr val="FFFFFF"/>
+                </a:solidFill>
+              </a14:hiddenFill>
+            </a:ext>
+          </a:extLst>
+        </p:spPr>
+      </p:pic>
+      <p:sp>
+        <p:nvSpPr>
+          <p:cNvPr id="8" name="Textplatzhalter 4"/>
+          <p:cNvSpPr txBox="1">
+            <a:spLocks/>
+          </p:cNvSpPr>
+          <p:nvPr/>
+        </p:nvSpPr>
+        <p:spPr>
+          <a:xfrm>
+            <a:off x="1147119" y="4806030"/>
+            <a:ext cx="7296150" cy="756000"/>
+          </a:xfrm>
+          <a:prstGeom prst="rect">
+            <a:avLst/>
+          </a:prstGeom>
+        </p:spPr>
+        <p:txBody>
+          <a:bodyPr vert="horz" lIns="91440" tIns="45720" rIns="91440" bIns="45720" rtlCol="0" anchor="ctr">
+            <a:normAutofit/>
+          </a:bodyPr>
+          <a:lstStyle>
+            <a:lvl1pPr marL="0" indent="0" algn="l" defTabSz="914400" rtl="0" eaLnBrk="1" latinLnBrk="0" hangingPunct="1">
+              <a:lnSpc>
+                <a:spcPct val="90000"/>
+              </a:lnSpc>
+              <a:spcBef>
+                <a:spcPts val="0"/>
+              </a:spcBef>
+              <a:buClr>
+                <a:schemeClr val="accent1"/>
+              </a:buClr>
+              <a:buSzPct val="80000"/>
+              <a:buFont typeface="Corbel" pitchFamily="34" charset="0"/>
+              <a:buNone/>
+              <a:defRPr sz="2400" b="1" kern="1200">
+                <a:solidFill>
+                  <a:schemeClr val="accent1"/>
+                </a:solidFill>
+                <a:latin typeface="+mn-lt"/>
+                <a:ea typeface="+mn-ea"/>
+                <a:cs typeface="+mn-cs"/>
+              </a:defRPr>
+            </a:lvl1pPr>
+            <a:lvl2pPr marL="457200" indent="0" algn="l" defTabSz="914400" rtl="0" eaLnBrk="1" latinLnBrk="0" hangingPunct="1">
+              <a:lnSpc>
+                <a:spcPct val="90000"/>
+              </a:lnSpc>
+              <a:spcBef>
+                <a:spcPts val="200"/>
+              </a:spcBef>
+              <a:spcAft>
+                <a:spcPts val="400"/>
+              </a:spcAft>
+              <a:buClr>
+                <a:schemeClr val="accent1"/>
+              </a:buClr>
+              <a:buSzPct val="80000"/>
+              <a:buFont typeface="Corbel" pitchFamily="34" charset="0"/>
+              <a:buNone/>
+              <a:defRPr sz="2000" b="1" kern="1200">
+                <a:solidFill>
+                  <a:schemeClr val="accent1"/>
+                </a:solidFill>
+                <a:latin typeface="+mn-lt"/>
+                <a:ea typeface="+mn-ea"/>
+                <a:cs typeface="+mn-cs"/>
+              </a:defRPr>
+            </a:lvl2pPr>
+            <a:lvl3pPr marL="914400" indent="0" algn="l" defTabSz="914400" rtl="0" eaLnBrk="1" latinLnBrk="0" hangingPunct="1">
+              <a:lnSpc>
+                <a:spcPct val="90000"/>
+              </a:lnSpc>
+              <a:spcBef>
+                <a:spcPts val="200"/>
+              </a:spcBef>
+              <a:spcAft>
+                <a:spcPts val="400"/>
+              </a:spcAft>
+              <a:buClr>
+                <a:schemeClr val="accent1"/>
+              </a:buClr>
+              <a:buSzPct val="80000"/>
+              <a:buFont typeface="Corbel" pitchFamily="34" charset="0"/>
+              <a:buNone/>
+              <a:defRPr sz="1800" b="1" kern="1200">
+                <a:solidFill>
+                  <a:schemeClr val="accent1"/>
+                </a:solidFill>
+                <a:latin typeface="+mn-lt"/>
+                <a:ea typeface="+mn-ea"/>
+                <a:cs typeface="+mn-cs"/>
+              </a:defRPr>
+            </a:lvl3pPr>
+            <a:lvl4pPr marL="1371600" indent="0" algn="l" defTabSz="914400" rtl="0" eaLnBrk="1" latinLnBrk="0" hangingPunct="1">
+              <a:lnSpc>
+                <a:spcPct val="90000"/>
+              </a:lnSpc>
+              <a:spcBef>
+                <a:spcPts val="200"/>
+              </a:spcBef>
+              <a:spcAft>
+                <a:spcPts val="400"/>
+              </a:spcAft>
+              <a:buClr>
+                <a:schemeClr val="accent1"/>
+              </a:buClr>
+              <a:buSzPct val="80000"/>
+              <a:buFont typeface="Corbel" pitchFamily="34" charset="0"/>
+              <a:buNone/>
+              <a:defRPr sz="1600" b="1" kern="1200">
+                <a:solidFill>
+                  <a:schemeClr val="accent1"/>
+                </a:solidFill>
+                <a:latin typeface="+mn-lt"/>
+                <a:ea typeface="+mn-ea"/>
+                <a:cs typeface="+mn-cs"/>
+              </a:defRPr>
+            </a:lvl4pPr>
+            <a:lvl5pPr marL="1828800" indent="0" algn="l" defTabSz="914400" rtl="0" eaLnBrk="1" latinLnBrk="0" hangingPunct="1">
+              <a:lnSpc>
+                <a:spcPct val="90000"/>
+              </a:lnSpc>
+              <a:spcBef>
+                <a:spcPts val="200"/>
+              </a:spcBef>
+              <a:spcAft>
+                <a:spcPts val="400"/>
+              </a:spcAft>
+              <a:buClr>
+                <a:schemeClr val="accent1"/>
+              </a:buClr>
+              <a:buSzPct val="80000"/>
+              <a:buFont typeface="Corbel" pitchFamily="34" charset="0"/>
+              <a:buNone/>
+              <a:defRPr sz="1600" b="1" kern="1200">
+                <a:solidFill>
+                  <a:schemeClr val="accent1"/>
+                </a:solidFill>
+                <a:latin typeface="+mn-lt"/>
+                <a:ea typeface="+mn-ea"/>
+                <a:cs typeface="+mn-cs"/>
+              </a:defRPr>
+            </a:lvl5pPr>
+            <a:lvl6pPr marL="2286000" indent="0" algn="l" defTabSz="914400" rtl="0" eaLnBrk="1" latinLnBrk="0" hangingPunct="1">
+              <a:lnSpc>
+                <a:spcPct val="90000"/>
+              </a:lnSpc>
+              <a:spcBef>
+                <a:spcPts val="200"/>
+              </a:spcBef>
+              <a:spcAft>
+                <a:spcPts val="400"/>
+              </a:spcAft>
+              <a:buClr>
+                <a:schemeClr val="accent1"/>
+              </a:buClr>
+              <a:buSzPct val="80000"/>
+              <a:buFont typeface="Corbel" pitchFamily="34" charset="0"/>
+              <a:buNone/>
+              <a:defRPr sz="1600" b="1" kern="1200">
+                <a:solidFill>
+                  <a:schemeClr val="accent1"/>
+                </a:solidFill>
+                <a:latin typeface="+mn-lt"/>
+                <a:ea typeface="+mn-ea"/>
+                <a:cs typeface="+mn-cs"/>
+              </a:defRPr>
+            </a:lvl6pPr>
+            <a:lvl7pPr marL="2743200" indent="0" algn="l" defTabSz="914400" rtl="0" eaLnBrk="1" latinLnBrk="0" hangingPunct="1">
+              <a:lnSpc>
+                <a:spcPct val="90000"/>
+              </a:lnSpc>
+              <a:spcBef>
+                <a:spcPts val="200"/>
+              </a:spcBef>
+              <a:spcAft>
+                <a:spcPts val="400"/>
+              </a:spcAft>
+              <a:buClr>
+                <a:schemeClr val="accent1"/>
+              </a:buClr>
+              <a:buSzPct val="80000"/>
+              <a:buFont typeface="Corbel" pitchFamily="34" charset="0"/>
+              <a:buNone/>
+              <a:defRPr sz="1600" b="1" kern="1200">
+                <a:solidFill>
+                  <a:schemeClr val="accent1"/>
+                </a:solidFill>
+                <a:latin typeface="+mn-lt"/>
+                <a:ea typeface="+mn-ea"/>
+                <a:cs typeface="+mn-cs"/>
+              </a:defRPr>
+            </a:lvl7pPr>
+            <a:lvl8pPr marL="3200400" indent="0" algn="l" defTabSz="914400" rtl="0" eaLnBrk="1" latinLnBrk="0" hangingPunct="1">
+              <a:lnSpc>
+                <a:spcPct val="90000"/>
+              </a:lnSpc>
+              <a:spcBef>
+                <a:spcPts val="200"/>
+              </a:spcBef>
+              <a:spcAft>
+                <a:spcPts val="400"/>
+              </a:spcAft>
+              <a:buClr>
+                <a:schemeClr val="accent1"/>
+              </a:buClr>
+              <a:buSzPct val="80000"/>
+              <a:buFont typeface="Corbel" pitchFamily="34" charset="0"/>
+              <a:buNone/>
+              <a:defRPr sz="1600" b="1" kern="1200">
+                <a:solidFill>
+                  <a:schemeClr val="accent1"/>
+                </a:solidFill>
+                <a:latin typeface="+mn-lt"/>
+                <a:ea typeface="+mn-ea"/>
+                <a:cs typeface="+mn-cs"/>
+              </a:defRPr>
+            </a:lvl8pPr>
+            <a:lvl9pPr marL="3657600" indent="0" algn="l" defTabSz="914400" rtl="0" eaLnBrk="1" latinLnBrk="0" hangingPunct="1">
+              <a:lnSpc>
+                <a:spcPct val="90000"/>
+              </a:lnSpc>
+              <a:spcBef>
+                <a:spcPts val="200"/>
+              </a:spcBef>
+              <a:spcAft>
+                <a:spcPts val="400"/>
+              </a:spcAft>
+              <a:buClr>
+                <a:schemeClr val="accent1"/>
+              </a:buClr>
+              <a:buSzPct val="80000"/>
+              <a:buFont typeface="Corbel" pitchFamily="34" charset="0"/>
+              <a:buNone/>
+              <a:defRPr sz="1600" b="1" kern="1200">
+                <a:solidFill>
+                  <a:schemeClr val="accent1"/>
+                </a:solidFill>
+                <a:latin typeface="+mn-lt"/>
+                <a:ea typeface="+mn-ea"/>
+                <a:cs typeface="+mn-cs"/>
+              </a:defRPr>
+            </a:lvl9pPr>
+          </a:lstStyle>
+          <a:p>
+            <a:r>
+              <a:rPr lang="de-DE" dirty="0" smtClean="0">
+                <a:solidFill>
+                  <a:schemeClr val="accent4">
+                    <a:lumMod val="75000"/>
+                  </a:schemeClr>
+                </a:solidFill>
+              </a:rPr>
+              <a:t>Evaluation </a:t>
+            </a:r>
+            <a:r>
+              <a:rPr lang="de-DE" dirty="0" err="1" smtClean="0">
+                <a:solidFill>
+                  <a:schemeClr val="accent4">
+                    <a:lumMod val="75000"/>
+                  </a:schemeClr>
+                </a:solidFill>
+              </a:rPr>
+              <a:t>using</a:t>
+            </a:r>
+            <a:r>
+              <a:rPr lang="de-DE" dirty="0" smtClean="0">
+                <a:solidFill>
+                  <a:schemeClr val="accent4">
+                    <a:lumMod val="75000"/>
+                  </a:schemeClr>
+                </a:solidFill>
+              </a:rPr>
+              <a:t> </a:t>
+            </a:r>
+            <a:r>
+              <a:rPr lang="de-DE" dirty="0" err="1" smtClean="0">
+                <a:solidFill>
+                  <a:schemeClr val="accent4">
+                    <a:lumMod val="75000"/>
+                  </a:schemeClr>
+                </a:solidFill>
+              </a:rPr>
+              <a:t>anlytical</a:t>
+            </a:r>
+            <a:r>
+              <a:rPr lang="de-DE" dirty="0" smtClean="0">
+                <a:solidFill>
+                  <a:schemeClr val="accent4">
+                    <a:lumMod val="75000"/>
+                  </a:schemeClr>
+                </a:solidFill>
+              </a:rPr>
+              <a:t> </a:t>
+            </a:r>
+            <a:r>
+              <a:rPr lang="de-DE" dirty="0" err="1" smtClean="0">
+                <a:solidFill>
+                  <a:schemeClr val="accent4">
+                    <a:lumMod val="75000"/>
+                  </a:schemeClr>
+                </a:solidFill>
+              </a:rPr>
+              <a:t>and</a:t>
+            </a:r>
+            <a:r>
+              <a:rPr lang="de-DE" dirty="0" smtClean="0">
+                <a:solidFill>
+                  <a:schemeClr val="accent4">
+                    <a:lumMod val="75000"/>
+                  </a:schemeClr>
+                </a:solidFill>
+              </a:rPr>
+              <a:t> </a:t>
+            </a:r>
+            <a:r>
+              <a:rPr lang="de-DE" dirty="0" err="1" smtClean="0">
+                <a:solidFill>
+                  <a:schemeClr val="accent4">
+                    <a:lumMod val="75000"/>
+                  </a:schemeClr>
+                </a:solidFill>
+              </a:rPr>
+              <a:t>empirical</a:t>
+            </a:r>
+            <a:r>
+              <a:rPr lang="de-DE" dirty="0" smtClean="0">
+                <a:solidFill>
+                  <a:schemeClr val="accent4">
+                    <a:lumMod val="75000"/>
+                  </a:schemeClr>
+                </a:solidFill>
+              </a:rPr>
+              <a:t> </a:t>
+            </a:r>
+            <a:r>
+              <a:rPr lang="de-DE" dirty="0" err="1" smtClean="0">
+                <a:solidFill>
+                  <a:schemeClr val="accent4">
+                    <a:lumMod val="75000"/>
+                  </a:schemeClr>
+                </a:solidFill>
+              </a:rPr>
+              <a:t>methods</a:t>
+            </a:r>
+            <a:endParaRPr lang="de-DE" baseline="-25000" dirty="0">
+              <a:solidFill>
+                <a:schemeClr val="accent4">
+                  <a:lumMod val="75000"/>
+                </a:schemeClr>
+              </a:solidFill>
+            </a:endParaRPr>
+          </a:p>
+        </p:txBody>
+      </p:sp>
+      <p:sp>
+        <p:nvSpPr>
+          <p:cNvPr id="9" name="Inhaltsplatzhalter 5"/>
+          <p:cNvSpPr txBox="1">
+            <a:spLocks/>
+          </p:cNvSpPr>
+          <p:nvPr/>
+        </p:nvSpPr>
+        <p:spPr>
+          <a:xfrm>
+            <a:off x="1147119" y="5526000"/>
+            <a:ext cx="8837140" cy="1332000"/>
+          </a:xfrm>
+          <a:prstGeom prst="rect">
+            <a:avLst/>
+          </a:prstGeom>
+        </p:spPr>
+        <p:txBody>
+          <a:bodyPr vert="horz" lIns="91440" tIns="45720" rIns="91440" bIns="45720" rtlCol="0">
+            <a:normAutofit/>
+          </a:bodyPr>
+          <a:lstStyle>
+            <a:lvl1pPr marL="228600" indent="-182880" algn="l" defTabSz="914400" rtl="0" eaLnBrk="1" latinLnBrk="0" hangingPunct="1">
+              <a:lnSpc>
+                <a:spcPct val="90000"/>
+              </a:lnSpc>
+              <a:spcBef>
+                <a:spcPts val="1400"/>
+              </a:spcBef>
+              <a:buClr>
+                <a:schemeClr val="accent1"/>
+              </a:buClr>
+              <a:buSzPct val="80000"/>
+              <a:buFont typeface="Corbel" pitchFamily="34" charset="0"/>
+              <a:buChar char="•"/>
+              <a:defRPr sz="2200" kern="1200">
+                <a:solidFill>
+                  <a:schemeClr val="accent1"/>
+                </a:solidFill>
+                <a:latin typeface="+mn-lt"/>
+                <a:ea typeface="+mn-ea"/>
+                <a:cs typeface="+mn-cs"/>
+              </a:defRPr>
+            </a:lvl1pPr>
+            <a:lvl2pPr marL="457200" indent="-182880" algn="l" defTabSz="914400" rtl="0" eaLnBrk="1" latinLnBrk="0" hangingPunct="1">
+              <a:lnSpc>
+                <a:spcPct val="90000"/>
+              </a:lnSpc>
+              <a:spcBef>
+                <a:spcPts val="200"/>
+              </a:spcBef>
+              <a:spcAft>
+                <a:spcPts val="400"/>
+              </a:spcAft>
+              <a:buClr>
+                <a:schemeClr val="accent1"/>
+              </a:buClr>
+              <a:buSzPct val="80000"/>
+              <a:buFont typeface="Corbel" pitchFamily="34" charset="0"/>
+              <a:buChar char="•"/>
+              <a:defRPr sz="2000" kern="1200">
+                <a:solidFill>
+                  <a:schemeClr val="accent1"/>
+                </a:solidFill>
+                <a:latin typeface="+mn-lt"/>
+                <a:ea typeface="+mn-ea"/>
+                <a:cs typeface="+mn-cs"/>
+              </a:defRPr>
+            </a:lvl2pPr>
+            <a:lvl3pPr marL="731520" indent="-182880" algn="l" defTabSz="914400" rtl="0" eaLnBrk="1" latinLnBrk="0" hangingPunct="1">
+              <a:lnSpc>
+                <a:spcPct val="90000"/>
+              </a:lnSpc>
+              <a:spcBef>
+                <a:spcPts val="200"/>
+              </a:spcBef>
+              <a:spcAft>
+                <a:spcPts val="400"/>
+              </a:spcAft>
+              <a:buClr>
+                <a:schemeClr val="accent1"/>
+              </a:buClr>
+              <a:buSzPct val="80000"/>
+              <a:buFont typeface="Corbel" pitchFamily="34" charset="0"/>
+              <a:buChar char="•"/>
+              <a:defRPr sz="1800" kern="1200">
+                <a:solidFill>
+                  <a:schemeClr val="accent1"/>
+                </a:solidFill>
+                <a:latin typeface="+mn-lt"/>
+                <a:ea typeface="+mn-ea"/>
+                <a:cs typeface="+mn-cs"/>
+              </a:defRPr>
+            </a:lvl3pPr>
+            <a:lvl4pPr marL="1005840" indent="-182880" algn="l" defTabSz="914400" rtl="0" eaLnBrk="1" latinLnBrk="0" hangingPunct="1">
+              <a:lnSpc>
+                <a:spcPct val="90000"/>
+              </a:lnSpc>
+              <a:spcBef>
+                <a:spcPts val="200"/>
+              </a:spcBef>
+              <a:spcAft>
+                <a:spcPts val="400"/>
+              </a:spcAft>
+              <a:buClr>
+                <a:schemeClr val="accent1"/>
+              </a:buClr>
+              <a:buSzPct val="80000"/>
+              <a:buFont typeface="Corbel" pitchFamily="34" charset="0"/>
+              <a:buChar char="•"/>
+              <a:defRPr sz="1600" kern="1200">
+                <a:solidFill>
+                  <a:schemeClr val="accent1"/>
+                </a:solidFill>
+                <a:latin typeface="+mn-lt"/>
+                <a:ea typeface="+mn-ea"/>
+                <a:cs typeface="+mn-cs"/>
+              </a:defRPr>
+            </a:lvl4pPr>
+            <a:lvl5pPr marL="1280160" indent="-182880" algn="l" defTabSz="914400" rtl="0" eaLnBrk="1" latinLnBrk="0" hangingPunct="1">
+              <a:lnSpc>
+                <a:spcPct val="90000"/>
+              </a:lnSpc>
+              <a:spcBef>
+                <a:spcPts val="200"/>
+              </a:spcBef>
+              <a:spcAft>
+                <a:spcPts val="400"/>
+              </a:spcAft>
+              <a:buClr>
+                <a:schemeClr val="accent1"/>
+              </a:buClr>
+              <a:buSzPct val="80000"/>
+              <a:buFont typeface="Corbel" pitchFamily="34" charset="0"/>
+              <a:buChar char="•"/>
+              <a:defRPr sz="1600" kern="1200">
+                <a:solidFill>
+                  <a:schemeClr val="accent1"/>
+                </a:solidFill>
+                <a:latin typeface="+mn-lt"/>
+                <a:ea typeface="+mn-ea"/>
+                <a:cs typeface="+mn-cs"/>
+              </a:defRPr>
+            </a:lvl5pPr>
+            <a:lvl6pPr marL="1600000" indent="-228600" algn="l" defTabSz="914400" rtl="0" eaLnBrk="1" latinLnBrk="0" hangingPunct="1">
+              <a:lnSpc>
+                <a:spcPct val="90000"/>
+              </a:lnSpc>
+              <a:spcBef>
+                <a:spcPts val="200"/>
+              </a:spcBef>
+              <a:spcAft>
+                <a:spcPts val="400"/>
+              </a:spcAft>
+              <a:buClr>
+                <a:schemeClr val="accent1"/>
+              </a:buClr>
+              <a:buSzPct val="80000"/>
+              <a:buFont typeface="Corbel" pitchFamily="34" charset="0"/>
+              <a:buChar char="•"/>
+              <a:defRPr sz="1600" kern="1200">
+                <a:solidFill>
+                  <a:schemeClr val="accent1"/>
+                </a:solidFill>
+                <a:latin typeface="+mn-lt"/>
+                <a:ea typeface="+mn-ea"/>
+                <a:cs typeface="+mn-cs"/>
+              </a:defRPr>
+            </a:lvl6pPr>
+            <a:lvl7pPr marL="1900000" indent="-228600" algn="l" defTabSz="914400" rtl="0" eaLnBrk="1" latinLnBrk="0" hangingPunct="1">
+              <a:lnSpc>
+                <a:spcPct val="90000"/>
+              </a:lnSpc>
+              <a:spcBef>
+                <a:spcPts val="200"/>
+              </a:spcBef>
+              <a:spcAft>
+                <a:spcPts val="400"/>
+              </a:spcAft>
+              <a:buClr>
+                <a:schemeClr val="accent1"/>
+              </a:buClr>
+              <a:buSzPct val="80000"/>
+              <a:buFont typeface="Corbel" pitchFamily="34" charset="0"/>
+              <a:buChar char="•"/>
+              <a:defRPr sz="1600" kern="1200">
+                <a:solidFill>
+                  <a:schemeClr val="accent1"/>
+                </a:solidFill>
+                <a:latin typeface="+mn-lt"/>
+                <a:ea typeface="+mn-ea"/>
+                <a:cs typeface="+mn-cs"/>
+              </a:defRPr>
+            </a:lvl7pPr>
+            <a:lvl8pPr marL="2200000" indent="-228600" algn="l" defTabSz="914400" rtl="0" eaLnBrk="1" latinLnBrk="0" hangingPunct="1">
+              <a:lnSpc>
+                <a:spcPct val="90000"/>
+              </a:lnSpc>
+              <a:spcBef>
+                <a:spcPts val="200"/>
+              </a:spcBef>
+              <a:spcAft>
+                <a:spcPts val="400"/>
+              </a:spcAft>
+              <a:buClr>
+                <a:schemeClr val="accent1"/>
+              </a:buClr>
+              <a:buSzPct val="80000"/>
+              <a:buFont typeface="Corbel" pitchFamily="34" charset="0"/>
+              <a:buChar char="•"/>
+              <a:defRPr sz="1600" kern="1200">
+                <a:solidFill>
+                  <a:schemeClr val="accent1"/>
+                </a:solidFill>
+                <a:latin typeface="+mn-lt"/>
+                <a:ea typeface="+mn-ea"/>
+                <a:cs typeface="+mn-cs"/>
+              </a:defRPr>
+            </a:lvl8pPr>
+            <a:lvl9pPr marL="2500000" indent="-228600" algn="l" defTabSz="914400" rtl="0" eaLnBrk="1" latinLnBrk="0" hangingPunct="1">
+              <a:lnSpc>
+                <a:spcPct val="90000"/>
+              </a:lnSpc>
+              <a:spcBef>
+                <a:spcPts val="200"/>
+              </a:spcBef>
+              <a:spcAft>
+                <a:spcPts val="400"/>
+              </a:spcAft>
+              <a:buClr>
+                <a:schemeClr val="accent1"/>
+              </a:buClr>
+              <a:buSzPct val="80000"/>
+              <a:buFont typeface="Corbel" pitchFamily="34" charset="0"/>
+              <a:buChar char="•"/>
+              <a:defRPr sz="1600" kern="1200">
+                <a:solidFill>
+                  <a:schemeClr val="accent1"/>
+                </a:solidFill>
+                <a:latin typeface="+mn-lt"/>
+                <a:ea typeface="+mn-ea"/>
+                <a:cs typeface="+mn-cs"/>
+              </a:defRPr>
+            </a:lvl9pPr>
+          </a:lstStyle>
+          <a:p>
+            <a:r>
+              <a:rPr lang="de-DE" dirty="0" smtClean="0"/>
+              <a:t>e.g. GOMS </a:t>
+            </a:r>
+            <a:r>
+              <a:rPr lang="de-DE" dirty="0"/>
+              <a:t>KLM</a:t>
+            </a:r>
+            <a:r>
+              <a:rPr lang="de-DE" baseline="-25000" dirty="0"/>
+              <a:t> [CARD1980, LI2010]</a:t>
+            </a:r>
+            <a:r>
+              <a:rPr lang="de-DE" dirty="0"/>
+              <a:t>, </a:t>
+            </a:r>
+            <a:r>
+              <a:rPr lang="de-DE" dirty="0" err="1" smtClean="0"/>
+              <a:t>heuristic</a:t>
+            </a:r>
+            <a:r>
+              <a:rPr lang="de-DE" dirty="0" smtClean="0"/>
+              <a:t> </a:t>
+            </a:r>
+            <a:r>
+              <a:rPr lang="de-DE" dirty="0" err="1" smtClean="0"/>
+              <a:t>evaluation</a:t>
+            </a:r>
+            <a:r>
+              <a:rPr lang="de-DE" dirty="0"/>
+              <a:t> </a:t>
+            </a:r>
+            <a:r>
+              <a:rPr lang="de-DE" baseline="-25000" dirty="0"/>
+              <a:t>[NIELSEN1990, NIELSEN1994], </a:t>
+            </a:r>
+            <a:r>
+              <a:rPr lang="de-DE" dirty="0" smtClean="0"/>
+              <a:t>lab </a:t>
+            </a:r>
+            <a:r>
+              <a:rPr lang="de-DE" dirty="0" err="1" smtClean="0"/>
+              <a:t>experiments</a:t>
+            </a:r>
+            <a:r>
+              <a:rPr lang="de-DE" dirty="0" smtClean="0"/>
+              <a:t> </a:t>
+            </a:r>
+            <a:r>
+              <a:rPr lang="de-DE" dirty="0" err="1" smtClean="0"/>
+              <a:t>or</a:t>
+            </a:r>
+            <a:r>
+              <a:rPr lang="de-DE" dirty="0" smtClean="0"/>
+              <a:t> </a:t>
+            </a:r>
+            <a:r>
+              <a:rPr lang="de-DE" dirty="0" err="1" smtClean="0"/>
+              <a:t>surveys</a:t>
+            </a:r>
+            <a:r>
+              <a:rPr lang="de-DE" dirty="0" smtClean="0"/>
+              <a:t> </a:t>
+            </a:r>
+            <a:endParaRPr lang="de-DE" dirty="0"/>
+          </a:p>
+        </p:txBody>
+      </p:sp>
+    </p:spTree>
+    <p:extLst>
+      <p:ext uri="{BB962C8B-B14F-4D97-AF65-F5344CB8AC3E}">
         <p14:creationId xmlns:p14="http://schemas.microsoft.com/office/powerpoint/2010/main" val="4251344815"/>
+      </p:ext>
+    </p:extLst>
+  </p:cSld>
+  <p:clrMapOvr>
+    <a:masterClrMapping/>
+  </p:clrMapOvr>
+</p:sld>
+</file>
+
+<file path=ppt/slides/slide6.xml><?xml version="1.0" encoding="utf-8"?>
+<p:sld xmlns:a="http://schemas.openxmlformats.org/drawingml/2006/main" xmlns:r="http://schemas.openxmlformats.org/officeDocument/2006/relationships" xmlns:p="http://schemas.openxmlformats.org/presentationml/2006/main">
+  <p:cSld>
+    <p:spTree>
+      <p:nvGrpSpPr>
+        <p:cNvPr id="1" name=""/>
+        <p:cNvGrpSpPr/>
+        <p:nvPr/>
+      </p:nvGrpSpPr>
+      <p:grpSpPr>
+        <a:xfrm>
+          <a:off x="0" y="0"/>
+          <a:ext cx="0" cy="0"/>
+          <a:chOff x="0" y="0"/>
+          <a:chExt cx="0" cy="0"/>
+        </a:xfrm>
+      </p:grpSpPr>
+      <p:sp>
+        <p:nvSpPr>
+          <p:cNvPr id="8" name="Inhaltsplatzhalter 7"/>
+          <p:cNvSpPr>
+            <a:spLocks noGrp="1"/>
+          </p:cNvSpPr>
+          <p:nvPr>
+            <p:ph idx="1"/>
+          </p:nvPr>
+        </p:nvSpPr>
+        <p:spPr>
+          <a:xfrm>
+            <a:off x="1143000" y="593124"/>
+            <a:ext cx="9872871" cy="5502876"/>
+          </a:xfrm>
+        </p:spPr>
+        <p:txBody>
+          <a:bodyPr numCol="2">
+            <a:noAutofit/>
+          </a:bodyPr>
+          <a:lstStyle/>
+          <a:p>
+            <a:pPr marL="45720" indent="0">
+              <a:lnSpc>
+                <a:spcPct val="120000"/>
+              </a:lnSpc>
+              <a:spcBef>
+                <a:spcPts val="600"/>
+              </a:spcBef>
+              <a:buNone/>
+            </a:pPr>
+            <a:r>
+              <a:rPr lang="en-GB" sz="800" dirty="0">
+                <a:latin typeface="Cambria Math" panose="02040503050406030204" pitchFamily="18" charset="0"/>
+                <a:ea typeface="Cambria Math" panose="02040503050406030204" pitchFamily="18" charset="0"/>
+              </a:rPr>
+              <a:t>[BEDERSON2004] </a:t>
+            </a:r>
+            <a:r>
+              <a:rPr lang="en-GB" sz="800" dirty="0" err="1">
+                <a:latin typeface="Cambria Math" panose="02040503050406030204" pitchFamily="18" charset="0"/>
+                <a:ea typeface="Cambria Math" panose="02040503050406030204" pitchFamily="18" charset="0"/>
+              </a:rPr>
+              <a:t>Bederson</a:t>
+            </a:r>
+            <a:r>
+              <a:rPr lang="en-GB" sz="800" dirty="0">
+                <a:latin typeface="Cambria Math" panose="02040503050406030204" pitchFamily="18" charset="0"/>
+                <a:ea typeface="Cambria Math" panose="02040503050406030204" pitchFamily="18" charset="0"/>
+              </a:rPr>
+              <a:t>, Benjamin B., et al. "</a:t>
+            </a:r>
+            <a:r>
+              <a:rPr lang="en-GB" sz="800" dirty="0" err="1">
+                <a:latin typeface="Cambria Math" panose="02040503050406030204" pitchFamily="18" charset="0"/>
+                <a:ea typeface="Cambria Math" panose="02040503050406030204" pitchFamily="18" charset="0"/>
+              </a:rPr>
+              <a:t>DateLens</a:t>
+            </a:r>
+            <a:r>
+              <a:rPr lang="en-GB" sz="800" dirty="0">
+                <a:latin typeface="Cambria Math" panose="02040503050406030204" pitchFamily="18" charset="0"/>
+                <a:ea typeface="Cambria Math" panose="02040503050406030204" pitchFamily="18" charset="0"/>
+              </a:rPr>
+              <a:t>: A fisheye calendar interface for PDAs." ACM Transactions on Computer-Human Interaction (TOCHI) 11.1 (2004): 90-119.</a:t>
+            </a:r>
+          </a:p>
+          <a:p>
+            <a:pPr marL="45720" indent="0">
+              <a:lnSpc>
+                <a:spcPct val="120000"/>
+              </a:lnSpc>
+              <a:spcBef>
+                <a:spcPts val="600"/>
+              </a:spcBef>
+              <a:buNone/>
+            </a:pPr>
+            <a:r>
+              <a:rPr lang="en-GB" sz="800" dirty="0">
+                <a:latin typeface="Cambria Math" panose="02040503050406030204" pitchFamily="18" charset="0"/>
+                <a:ea typeface="Cambria Math" panose="02040503050406030204" pitchFamily="18" charset="0"/>
+              </a:rPr>
+              <a:t>[BENYON2010] </a:t>
+            </a:r>
+            <a:r>
+              <a:rPr lang="en-GB" sz="800" dirty="0" err="1">
+                <a:latin typeface="Cambria Math" panose="02040503050406030204" pitchFamily="18" charset="0"/>
+                <a:ea typeface="Cambria Math" panose="02040503050406030204" pitchFamily="18" charset="0"/>
+              </a:rPr>
+              <a:t>Benyon</a:t>
+            </a:r>
+            <a:r>
+              <a:rPr lang="en-GB" sz="800" dirty="0">
+                <a:latin typeface="Cambria Math" panose="02040503050406030204" pitchFamily="18" charset="0"/>
+                <a:ea typeface="Cambria Math" panose="02040503050406030204" pitchFamily="18" charset="0"/>
+              </a:rPr>
+              <a:t>, David. "Designing interactive systems: a comprehensive guide to HCI and interaction design . </a:t>
+            </a:r>
+            <a:r>
+              <a:rPr lang="en-GB" sz="800" dirty="0" err="1">
+                <a:latin typeface="Cambria Math" panose="02040503050406030204" pitchFamily="18" charset="0"/>
+                <a:ea typeface="Cambria Math" panose="02040503050406030204" pitchFamily="18" charset="0"/>
+              </a:rPr>
+              <a:t>cf</a:t>
+            </a:r>
+            <a:r>
+              <a:rPr lang="en-GB" sz="800" dirty="0">
+                <a:latin typeface="Cambria Math" panose="02040503050406030204" pitchFamily="18" charset="0"/>
+                <a:ea typeface="Cambria Math" panose="02040503050406030204" pitchFamily="18" charset="0"/>
+              </a:rPr>
+              <a:t>: 8 </a:t>
+            </a:r>
+            <a:r>
+              <a:rPr lang="en-GB" sz="800" dirty="0" err="1">
+                <a:latin typeface="Cambria Math" panose="02040503050406030204" pitchFamily="18" charset="0"/>
+                <a:ea typeface="Cambria Math" panose="02040503050406030204" pitchFamily="18" charset="0"/>
+              </a:rPr>
+              <a:t>Envisonment</a:t>
+            </a:r>
+            <a:r>
+              <a:rPr lang="en-GB" sz="800" dirty="0">
+                <a:latin typeface="Cambria Math" panose="02040503050406030204" pitchFamily="18" charset="0"/>
+                <a:ea typeface="Cambria Math" panose="02040503050406030204" pitchFamily="18" charset="0"/>
+              </a:rPr>
+              <a:t>." (2010).</a:t>
+            </a:r>
+          </a:p>
+          <a:p>
+            <a:pPr marL="45720" indent="0">
+              <a:lnSpc>
+                <a:spcPct val="120000"/>
+              </a:lnSpc>
+              <a:spcBef>
+                <a:spcPts val="600"/>
+              </a:spcBef>
+              <a:buNone/>
+            </a:pPr>
+            <a:r>
+              <a:rPr lang="en-GB" sz="800" dirty="0">
+                <a:latin typeface="Cambria Math" panose="02040503050406030204" pitchFamily="18" charset="0"/>
+                <a:ea typeface="Cambria Math" panose="02040503050406030204" pitchFamily="18" charset="0"/>
+              </a:rPr>
+              <a:t>[BI2013] Bi, </a:t>
+            </a:r>
+            <a:r>
+              <a:rPr lang="en-GB" sz="800" dirty="0" err="1">
+                <a:latin typeface="Cambria Math" panose="02040503050406030204" pitchFamily="18" charset="0"/>
+                <a:ea typeface="Cambria Math" panose="02040503050406030204" pitchFamily="18" charset="0"/>
+              </a:rPr>
+              <a:t>Xiaojun</a:t>
+            </a:r>
+            <a:r>
+              <a:rPr lang="en-GB" sz="800" dirty="0">
+                <a:latin typeface="Cambria Math" panose="02040503050406030204" pitchFamily="18" charset="0"/>
+                <a:ea typeface="Cambria Math" panose="02040503050406030204" pitchFamily="18" charset="0"/>
+              </a:rPr>
+              <a:t>, Yang Li, and </a:t>
+            </a:r>
+            <a:r>
+              <a:rPr lang="en-GB" sz="800" dirty="0" err="1">
+                <a:latin typeface="Cambria Math" panose="02040503050406030204" pitchFamily="18" charset="0"/>
+                <a:ea typeface="Cambria Math" panose="02040503050406030204" pitchFamily="18" charset="0"/>
+              </a:rPr>
+              <a:t>Shumin</a:t>
+            </a:r>
+            <a:r>
+              <a:rPr lang="en-GB" sz="800" dirty="0">
+                <a:latin typeface="Cambria Math" panose="02040503050406030204" pitchFamily="18" charset="0"/>
+                <a:ea typeface="Cambria Math" panose="02040503050406030204" pitchFamily="18" charset="0"/>
+              </a:rPr>
+              <a:t> </a:t>
+            </a:r>
+            <a:r>
+              <a:rPr lang="en-GB" sz="800" dirty="0" err="1">
+                <a:latin typeface="Cambria Math" panose="02040503050406030204" pitchFamily="18" charset="0"/>
+                <a:ea typeface="Cambria Math" panose="02040503050406030204" pitchFamily="18" charset="0"/>
+              </a:rPr>
+              <a:t>Zhai</a:t>
+            </a:r>
+            <a:r>
+              <a:rPr lang="en-GB" sz="800" dirty="0">
+                <a:latin typeface="Cambria Math" panose="02040503050406030204" pitchFamily="18" charset="0"/>
+                <a:ea typeface="Cambria Math" panose="02040503050406030204" pitchFamily="18" charset="0"/>
+              </a:rPr>
+              <a:t>. "</a:t>
+            </a:r>
+            <a:r>
+              <a:rPr lang="en-GB" sz="800" dirty="0" err="1">
+                <a:latin typeface="Cambria Math" panose="02040503050406030204" pitchFamily="18" charset="0"/>
+                <a:ea typeface="Cambria Math" panose="02040503050406030204" pitchFamily="18" charset="0"/>
+              </a:rPr>
+              <a:t>FFitts</a:t>
+            </a:r>
+            <a:r>
+              <a:rPr lang="en-GB" sz="800" dirty="0">
+                <a:latin typeface="Cambria Math" panose="02040503050406030204" pitchFamily="18" charset="0"/>
+                <a:ea typeface="Cambria Math" panose="02040503050406030204" pitchFamily="18" charset="0"/>
+              </a:rPr>
+              <a:t> law: </a:t>
+            </a:r>
+            <a:r>
+              <a:rPr lang="en-GB" sz="800" dirty="0" err="1">
+                <a:latin typeface="Cambria Math" panose="02040503050406030204" pitchFamily="18" charset="0"/>
+                <a:ea typeface="Cambria Math" panose="02040503050406030204" pitchFamily="18" charset="0"/>
+              </a:rPr>
+              <a:t>modeling</a:t>
+            </a:r>
+            <a:r>
+              <a:rPr lang="en-GB" sz="800" dirty="0">
+                <a:latin typeface="Cambria Math" panose="02040503050406030204" pitchFamily="18" charset="0"/>
+                <a:ea typeface="Cambria Math" panose="02040503050406030204" pitchFamily="18" charset="0"/>
+              </a:rPr>
+              <a:t> finger touch with </a:t>
+            </a:r>
+            <a:r>
+              <a:rPr lang="en-GB" sz="800" dirty="0" err="1">
+                <a:latin typeface="Cambria Math" panose="02040503050406030204" pitchFamily="18" charset="0"/>
+                <a:ea typeface="Cambria Math" panose="02040503050406030204" pitchFamily="18" charset="0"/>
+              </a:rPr>
+              <a:t>fitts</a:t>
+            </a:r>
+            <a:r>
+              <a:rPr lang="en-GB" sz="800" dirty="0">
+                <a:latin typeface="Cambria Math" panose="02040503050406030204" pitchFamily="18" charset="0"/>
+                <a:ea typeface="Cambria Math" panose="02040503050406030204" pitchFamily="18" charset="0"/>
+              </a:rPr>
+              <a:t>' law." Proceedings of the SIGCHI Conference on Human Factors in Computing Systems. ACM, 2013.</a:t>
+            </a:r>
+          </a:p>
+          <a:p>
+            <a:pPr marL="45720" indent="0">
+              <a:lnSpc>
+                <a:spcPct val="120000"/>
+              </a:lnSpc>
+              <a:spcBef>
+                <a:spcPts val="600"/>
+              </a:spcBef>
+              <a:buNone/>
+            </a:pPr>
+            <a:r>
+              <a:rPr lang="en-GB" sz="800" dirty="0">
+                <a:latin typeface="Cambria Math" panose="02040503050406030204" pitchFamily="18" charset="0"/>
+                <a:ea typeface="Cambria Math" panose="02040503050406030204" pitchFamily="18" charset="0"/>
+              </a:rPr>
+              <a:t>[BUTLER2008] Butler, Alex, </a:t>
+            </a:r>
+            <a:r>
+              <a:rPr lang="en-GB" sz="800" dirty="0" err="1">
+                <a:latin typeface="Cambria Math" panose="02040503050406030204" pitchFamily="18" charset="0"/>
+                <a:ea typeface="Cambria Math" panose="02040503050406030204" pitchFamily="18" charset="0"/>
+              </a:rPr>
+              <a:t>Shahram</a:t>
+            </a:r>
+            <a:r>
+              <a:rPr lang="en-GB" sz="800" dirty="0">
+                <a:latin typeface="Cambria Math" panose="02040503050406030204" pitchFamily="18" charset="0"/>
+                <a:ea typeface="Cambria Math" panose="02040503050406030204" pitchFamily="18" charset="0"/>
+              </a:rPr>
+              <a:t> Izadi, and Steve Hodges. "</a:t>
+            </a:r>
+            <a:r>
+              <a:rPr lang="en-GB" sz="800" dirty="0" err="1">
+                <a:latin typeface="Cambria Math" panose="02040503050406030204" pitchFamily="18" charset="0"/>
+                <a:ea typeface="Cambria Math" panose="02040503050406030204" pitchFamily="18" charset="0"/>
+              </a:rPr>
+              <a:t>SideSight</a:t>
+            </a:r>
+            <a:r>
+              <a:rPr lang="en-GB" sz="800" dirty="0">
+                <a:latin typeface="Cambria Math" panose="02040503050406030204" pitchFamily="18" charset="0"/>
+                <a:ea typeface="Cambria Math" panose="02040503050406030204" pitchFamily="18" charset="0"/>
+              </a:rPr>
+              <a:t>: multi-touch interaction around small devices." Proceedings of the 21st annual ACM symposium on User interface software and technology. ACM, 2008.</a:t>
+            </a:r>
+          </a:p>
+          <a:p>
+            <a:pPr marL="45720" indent="0">
+              <a:lnSpc>
+                <a:spcPct val="120000"/>
+              </a:lnSpc>
+              <a:spcBef>
+                <a:spcPts val="600"/>
+              </a:spcBef>
+              <a:buNone/>
+            </a:pPr>
+            <a:r>
+              <a:rPr lang="en-GB" sz="800" dirty="0">
+                <a:latin typeface="Cambria Math" panose="02040503050406030204" pitchFamily="18" charset="0"/>
+                <a:ea typeface="Cambria Math" panose="02040503050406030204" pitchFamily="18" charset="0"/>
+              </a:rPr>
+              <a:t>[CARD1980] Stuart K. Card, Thomas P. Moran, and Allen Newell. 1980. The keystroke-level model for user performance time with interactive systems. </a:t>
+            </a:r>
+            <a:r>
+              <a:rPr lang="en-GB" sz="800" dirty="0" err="1">
+                <a:latin typeface="Cambria Math" panose="02040503050406030204" pitchFamily="18" charset="0"/>
+                <a:ea typeface="Cambria Math" panose="02040503050406030204" pitchFamily="18" charset="0"/>
+              </a:rPr>
+              <a:t>Commun</a:t>
+            </a:r>
+            <a:r>
+              <a:rPr lang="en-GB" sz="800" dirty="0">
+                <a:latin typeface="Cambria Math" panose="02040503050406030204" pitchFamily="18" charset="0"/>
+                <a:ea typeface="Cambria Math" panose="02040503050406030204" pitchFamily="18" charset="0"/>
+              </a:rPr>
+              <a:t>. ACM 23, 7 (July 1980), 396-410. </a:t>
+            </a:r>
+          </a:p>
+          <a:p>
+            <a:pPr marL="45720" indent="0">
+              <a:lnSpc>
+                <a:spcPct val="120000"/>
+              </a:lnSpc>
+              <a:spcBef>
+                <a:spcPts val="600"/>
+              </a:spcBef>
+              <a:buNone/>
+            </a:pPr>
+            <a:r>
+              <a:rPr lang="en-GB" sz="800" dirty="0">
+                <a:latin typeface="Cambria Math" panose="02040503050406030204" pitchFamily="18" charset="0"/>
+                <a:ea typeface="Cambria Math" panose="02040503050406030204" pitchFamily="18" charset="0"/>
+              </a:rPr>
+              <a:t>[CHANG2013] Chang, Kerry Shih-Ping, et al. "Improving structured data entry on mobile devices." Proceedings of the 26th annual ACM symposium on User interface software and technology. ACM, 2013.</a:t>
+            </a:r>
+          </a:p>
+          <a:p>
+            <a:pPr marL="45720" indent="0">
+              <a:lnSpc>
+                <a:spcPct val="120000"/>
+              </a:lnSpc>
+              <a:spcBef>
+                <a:spcPts val="600"/>
+              </a:spcBef>
+              <a:buNone/>
+            </a:pPr>
+            <a:r>
+              <a:rPr lang="en-GB" sz="800" dirty="0">
+                <a:latin typeface="Cambria Math" panose="02040503050406030204" pitchFamily="18" charset="0"/>
+                <a:ea typeface="Cambria Math" panose="02040503050406030204" pitchFamily="18" charset="0"/>
+              </a:rPr>
+              <a:t>[DESIGNCOUNCIL2006] Council, Design. "Double diamond design process." (2006).</a:t>
+            </a:r>
+          </a:p>
+          <a:p>
+            <a:pPr marL="45720" indent="0">
+              <a:lnSpc>
+                <a:spcPct val="120000"/>
+              </a:lnSpc>
+              <a:spcBef>
+                <a:spcPts val="600"/>
+              </a:spcBef>
+              <a:buNone/>
+            </a:pPr>
+            <a:r>
+              <a:rPr lang="en-GB" sz="800" dirty="0">
+                <a:latin typeface="Cambria Math" panose="02040503050406030204" pitchFamily="18" charset="0"/>
+                <a:ea typeface="Cambria Math" panose="02040503050406030204" pitchFamily="18" charset="0"/>
+              </a:rPr>
+              <a:t>[DIX2009] Dix, Alan. Human-computer interaction. Springer US, 2009.</a:t>
+            </a:r>
+          </a:p>
+          <a:p>
+            <a:pPr marL="45720" indent="0">
+              <a:lnSpc>
+                <a:spcPct val="120000"/>
+              </a:lnSpc>
+              <a:spcBef>
+                <a:spcPts val="600"/>
+              </a:spcBef>
+              <a:buNone/>
+            </a:pPr>
+            <a:r>
+              <a:rPr lang="en-GB" sz="800" dirty="0">
+                <a:latin typeface="Cambria Math" panose="02040503050406030204" pitchFamily="18" charset="0"/>
+                <a:ea typeface="Cambria Math" panose="02040503050406030204" pitchFamily="18" charset="0"/>
+              </a:rPr>
+              <a:t>[GUIARD1987] </a:t>
+            </a:r>
+            <a:r>
+              <a:rPr lang="en-GB" sz="800" dirty="0" err="1">
+                <a:latin typeface="Cambria Math" panose="02040503050406030204" pitchFamily="18" charset="0"/>
+                <a:ea typeface="Cambria Math" panose="02040503050406030204" pitchFamily="18" charset="0"/>
+              </a:rPr>
+              <a:t>Guiard</a:t>
+            </a:r>
+            <a:r>
+              <a:rPr lang="en-GB" sz="800" dirty="0">
+                <a:latin typeface="Cambria Math" panose="02040503050406030204" pitchFamily="18" charset="0"/>
+                <a:ea typeface="Cambria Math" panose="02040503050406030204" pitchFamily="18" charset="0"/>
+              </a:rPr>
+              <a:t>, Yves. "Asymmetric division of </a:t>
+            </a:r>
+            <a:r>
+              <a:rPr lang="en-GB" sz="800" dirty="0" err="1">
+                <a:latin typeface="Cambria Math" panose="02040503050406030204" pitchFamily="18" charset="0"/>
+                <a:ea typeface="Cambria Math" panose="02040503050406030204" pitchFamily="18" charset="0"/>
+              </a:rPr>
+              <a:t>labor</a:t>
+            </a:r>
+            <a:r>
+              <a:rPr lang="en-GB" sz="800" dirty="0">
+                <a:latin typeface="Cambria Math" panose="02040503050406030204" pitchFamily="18" charset="0"/>
+                <a:ea typeface="Cambria Math" panose="02040503050406030204" pitchFamily="18" charset="0"/>
+              </a:rPr>
+              <a:t> in human skilled bimanual action: The kinematic chain as a model." Journal of motor </a:t>
+            </a:r>
+            <a:r>
+              <a:rPr lang="en-GB" sz="800" dirty="0" err="1">
+                <a:latin typeface="Cambria Math" panose="02040503050406030204" pitchFamily="18" charset="0"/>
+                <a:ea typeface="Cambria Math" panose="02040503050406030204" pitchFamily="18" charset="0"/>
+              </a:rPr>
+              <a:t>behavior</a:t>
+            </a:r>
+            <a:r>
+              <a:rPr lang="en-GB" sz="800" dirty="0">
+                <a:latin typeface="Cambria Math" panose="02040503050406030204" pitchFamily="18" charset="0"/>
+                <a:ea typeface="Cambria Math" panose="02040503050406030204" pitchFamily="18" charset="0"/>
+              </a:rPr>
+              <a:t> 19.4 (1987): 486-517.</a:t>
+            </a:r>
+          </a:p>
+          <a:p>
+            <a:pPr marL="45720" indent="0">
+              <a:lnSpc>
+                <a:spcPct val="120000"/>
+              </a:lnSpc>
+              <a:spcBef>
+                <a:spcPts val="600"/>
+              </a:spcBef>
+              <a:buNone/>
+            </a:pPr>
+            <a:r>
+              <a:rPr lang="en-GB" sz="800" dirty="0">
+                <a:latin typeface="Cambria Math" panose="02040503050406030204" pitchFamily="18" charset="0"/>
+                <a:ea typeface="Cambria Math" panose="02040503050406030204" pitchFamily="18" charset="0"/>
+              </a:rPr>
+              <a:t>[HOPKINS1988] Hopkins, Don, Jack Callahan, and Mark Weiser. "Pies: implementation, evaluation and application of circular menus." University of Maryland Computer Science Department Technical Report (1988).</a:t>
+            </a:r>
+          </a:p>
+          <a:p>
+            <a:pPr marL="45720" indent="0">
+              <a:lnSpc>
+                <a:spcPct val="120000"/>
+              </a:lnSpc>
+              <a:spcBef>
+                <a:spcPts val="600"/>
+              </a:spcBef>
+              <a:buNone/>
+            </a:pPr>
+            <a:r>
+              <a:rPr lang="en-GB" sz="800" dirty="0">
+                <a:latin typeface="Cambria Math" panose="02040503050406030204" pitchFamily="18" charset="0"/>
+                <a:ea typeface="Cambria Math" panose="02040503050406030204" pitchFamily="18" charset="0"/>
+              </a:rPr>
+              <a:t>[IDEO2003] IDEO. "method cards: 51 ways to inspire design." Palo Alto (2003).</a:t>
+            </a:r>
+          </a:p>
+          <a:p>
+            <a:pPr marL="45720" indent="0">
+              <a:lnSpc>
+                <a:spcPct val="120000"/>
+              </a:lnSpc>
+              <a:spcBef>
+                <a:spcPts val="600"/>
+              </a:spcBef>
+              <a:buNone/>
+            </a:pPr>
+            <a:r>
+              <a:rPr lang="en-GB" sz="800" dirty="0">
+                <a:latin typeface="Cambria Math" panose="02040503050406030204" pitchFamily="18" charset="0"/>
+                <a:ea typeface="Cambria Math" panose="02040503050406030204" pitchFamily="18" charset="0"/>
+              </a:rPr>
+              <a:t>[ILAMA2015] </a:t>
+            </a:r>
+            <a:r>
+              <a:rPr lang="en-GB" sz="800" dirty="0" err="1">
+                <a:latin typeface="Cambria Math" panose="02040503050406030204" pitchFamily="18" charset="0"/>
+                <a:ea typeface="Cambria Math" panose="02040503050406030204" pitchFamily="18" charset="0"/>
+              </a:rPr>
+              <a:t>Ilama</a:t>
+            </a:r>
+            <a:r>
+              <a:rPr lang="en-GB" sz="800" dirty="0">
+                <a:latin typeface="Cambria Math" panose="02040503050406030204" pitchFamily="18" charset="0"/>
+                <a:ea typeface="Cambria Math" panose="02040503050406030204" pitchFamily="18" charset="0"/>
+              </a:rPr>
+              <a:t>, </a:t>
+            </a:r>
+            <a:r>
+              <a:rPr lang="en-GB" sz="800" dirty="0" err="1">
+                <a:latin typeface="Cambria Math" panose="02040503050406030204" pitchFamily="18" charset="0"/>
+                <a:ea typeface="Cambria Math" panose="02040503050406030204" pitchFamily="18" charset="0"/>
+              </a:rPr>
+              <a:t>Eeva</a:t>
+            </a:r>
+            <a:r>
+              <a:rPr lang="en-GB" sz="800" dirty="0">
+                <a:latin typeface="Cambria Math" panose="02040503050406030204" pitchFamily="18" charset="0"/>
+                <a:ea typeface="Cambria Math" panose="02040503050406030204" pitchFamily="18" charset="0"/>
+              </a:rPr>
+              <a:t>. "Creating Personas." (http://www.uxbooth.com/articles/creating-personas/, retrieved 11/06/2016).</a:t>
+            </a:r>
+          </a:p>
+          <a:p>
+            <a:pPr marL="45720" indent="0">
+              <a:lnSpc>
+                <a:spcPct val="120000"/>
+              </a:lnSpc>
+              <a:spcBef>
+                <a:spcPts val="600"/>
+              </a:spcBef>
+              <a:buNone/>
+            </a:pPr>
+            <a:r>
+              <a:rPr lang="en-GB" sz="800" dirty="0">
+                <a:latin typeface="Cambria Math" panose="02040503050406030204" pitchFamily="18" charset="0"/>
+                <a:ea typeface="Cambria Math" panose="02040503050406030204" pitchFamily="18" charset="0"/>
+              </a:rPr>
+              <a:t>[JONES2016] Jones, Steve. "User Experience Implications of the Floating Action Button." (2016).</a:t>
+            </a:r>
+          </a:p>
+          <a:p>
+            <a:pPr marL="45720" indent="0">
+              <a:lnSpc>
+                <a:spcPct val="120000"/>
+              </a:lnSpc>
+              <a:spcBef>
+                <a:spcPts val="600"/>
+              </a:spcBef>
+              <a:buNone/>
+            </a:pPr>
+            <a:r>
+              <a:rPr lang="en-GB" sz="800" dirty="0">
+                <a:latin typeface="Cambria Math" panose="02040503050406030204" pitchFamily="18" charset="0"/>
+                <a:ea typeface="Cambria Math" panose="02040503050406030204" pitchFamily="18" charset="0"/>
+              </a:rPr>
+              <a:t>[KIN2011] Kin, </a:t>
+            </a:r>
+            <a:r>
+              <a:rPr lang="en-GB" sz="800" dirty="0" err="1">
+                <a:latin typeface="Cambria Math" panose="02040503050406030204" pitchFamily="18" charset="0"/>
+                <a:ea typeface="Cambria Math" panose="02040503050406030204" pitchFamily="18" charset="0"/>
+              </a:rPr>
+              <a:t>Kenrick</a:t>
+            </a:r>
+            <a:r>
+              <a:rPr lang="en-GB" sz="800" dirty="0">
+                <a:latin typeface="Cambria Math" panose="02040503050406030204" pitchFamily="18" charset="0"/>
+                <a:ea typeface="Cambria Math" panose="02040503050406030204" pitchFamily="18" charset="0"/>
+              </a:rPr>
+              <a:t>, </a:t>
+            </a:r>
+            <a:r>
+              <a:rPr lang="en-GB" sz="800" dirty="0" err="1">
+                <a:latin typeface="Cambria Math" panose="02040503050406030204" pitchFamily="18" charset="0"/>
+                <a:ea typeface="Cambria Math" panose="02040503050406030204" pitchFamily="18" charset="0"/>
+              </a:rPr>
+              <a:t>Björn</a:t>
+            </a:r>
+            <a:r>
+              <a:rPr lang="en-GB" sz="800" dirty="0">
+                <a:latin typeface="Cambria Math" panose="02040503050406030204" pitchFamily="18" charset="0"/>
+                <a:ea typeface="Cambria Math" panose="02040503050406030204" pitchFamily="18" charset="0"/>
+              </a:rPr>
+              <a:t> Hartmann, and </a:t>
+            </a:r>
+            <a:r>
+              <a:rPr lang="en-GB" sz="800" dirty="0" err="1">
+                <a:latin typeface="Cambria Math" panose="02040503050406030204" pitchFamily="18" charset="0"/>
+                <a:ea typeface="Cambria Math" panose="02040503050406030204" pitchFamily="18" charset="0"/>
+              </a:rPr>
+              <a:t>Maneesh</a:t>
+            </a:r>
+            <a:r>
+              <a:rPr lang="en-GB" sz="800" dirty="0">
+                <a:latin typeface="Cambria Math" panose="02040503050406030204" pitchFamily="18" charset="0"/>
+                <a:ea typeface="Cambria Math" panose="02040503050406030204" pitchFamily="18" charset="0"/>
+              </a:rPr>
+              <a:t> </a:t>
+            </a:r>
+            <a:r>
+              <a:rPr lang="en-GB" sz="800" dirty="0" err="1">
+                <a:latin typeface="Cambria Math" panose="02040503050406030204" pitchFamily="18" charset="0"/>
+                <a:ea typeface="Cambria Math" panose="02040503050406030204" pitchFamily="18" charset="0"/>
+              </a:rPr>
+              <a:t>Agrawala</a:t>
+            </a:r>
+            <a:r>
+              <a:rPr lang="en-GB" sz="800" dirty="0">
+                <a:latin typeface="Cambria Math" panose="02040503050406030204" pitchFamily="18" charset="0"/>
+                <a:ea typeface="Cambria Math" panose="02040503050406030204" pitchFamily="18" charset="0"/>
+              </a:rPr>
+              <a:t>. "Two-handed marking menus for </a:t>
+            </a:r>
+            <a:r>
+              <a:rPr lang="en-GB" sz="800" dirty="0" err="1">
+                <a:latin typeface="Cambria Math" panose="02040503050406030204" pitchFamily="18" charset="0"/>
+                <a:ea typeface="Cambria Math" panose="02040503050406030204" pitchFamily="18" charset="0"/>
+              </a:rPr>
+              <a:t>multitouch</a:t>
+            </a:r>
+            <a:r>
+              <a:rPr lang="en-GB" sz="800" dirty="0">
+                <a:latin typeface="Cambria Math" panose="02040503050406030204" pitchFamily="18" charset="0"/>
+                <a:ea typeface="Cambria Math" panose="02040503050406030204" pitchFamily="18" charset="0"/>
+              </a:rPr>
+              <a:t> devices." ACM Transactions on Computer-Human Interaction (TOCHI) 18.3 (2011): 16.</a:t>
+            </a:r>
+          </a:p>
+          <a:p>
+            <a:pPr marL="45720" indent="0">
+              <a:lnSpc>
+                <a:spcPct val="120000"/>
+              </a:lnSpc>
+              <a:spcBef>
+                <a:spcPts val="600"/>
+              </a:spcBef>
+              <a:buNone/>
+            </a:pPr>
+            <a:r>
+              <a:rPr lang="en-GB" sz="800" dirty="0">
+                <a:latin typeface="Cambria Math" panose="02040503050406030204" pitchFamily="18" charset="0"/>
+                <a:ea typeface="Cambria Math" panose="02040503050406030204" pitchFamily="18" charset="0"/>
+              </a:rPr>
+              <a:t>[KURTENBACH1993] </a:t>
+            </a:r>
+            <a:r>
+              <a:rPr lang="en-GB" sz="800" dirty="0" err="1">
+                <a:latin typeface="Cambria Math" panose="02040503050406030204" pitchFamily="18" charset="0"/>
+                <a:ea typeface="Cambria Math" panose="02040503050406030204" pitchFamily="18" charset="0"/>
+              </a:rPr>
+              <a:t>Kurtenbach</a:t>
+            </a:r>
+            <a:r>
+              <a:rPr lang="en-GB" sz="800" dirty="0">
+                <a:latin typeface="Cambria Math" panose="02040503050406030204" pitchFamily="18" charset="0"/>
+                <a:ea typeface="Cambria Math" panose="02040503050406030204" pitchFamily="18" charset="0"/>
+              </a:rPr>
+              <a:t>, Gordon, and William Buxton. "The limits of expert performance using hierarchic marking menus." Proceedings of the INTERACT'93 and CHI'93 conference on Human factors in computing systems. ACM, 1993.</a:t>
+            </a:r>
+          </a:p>
+          <a:p>
+            <a:pPr marL="45720" indent="0">
+              <a:lnSpc>
+                <a:spcPct val="120000"/>
+              </a:lnSpc>
+              <a:spcBef>
+                <a:spcPts val="600"/>
+              </a:spcBef>
+              <a:buNone/>
+            </a:pPr>
+            <a:r>
+              <a:rPr lang="en-GB" sz="800" dirty="0">
+                <a:latin typeface="Cambria Math" panose="02040503050406030204" pitchFamily="18" charset="0"/>
+                <a:ea typeface="Cambria Math" panose="02040503050406030204" pitchFamily="18" charset="0"/>
+              </a:rPr>
+              <a:t>[LI2010] Li, Hui, et al. "Extended KLM for mobile phone interaction: a user study result." CHI'10 Extended Abstracts on Human Factors in Computing Systems. ACM, 2010.</a:t>
+            </a:r>
+          </a:p>
+          <a:p>
+            <a:pPr marL="45720" indent="0">
+              <a:lnSpc>
+                <a:spcPct val="120000"/>
+              </a:lnSpc>
+              <a:spcBef>
+                <a:spcPts val="600"/>
+              </a:spcBef>
+              <a:buNone/>
+            </a:pPr>
+            <a:r>
+              <a:rPr lang="en-GB" sz="800" dirty="0">
+                <a:latin typeface="Cambria Math" panose="02040503050406030204" pitchFamily="18" charset="0"/>
+                <a:ea typeface="Cambria Math" panose="02040503050406030204" pitchFamily="18" charset="0"/>
+              </a:rPr>
+              <a:t>[MALACRIA2013] </a:t>
+            </a:r>
+            <a:r>
+              <a:rPr lang="en-GB" sz="800" dirty="0" err="1">
+                <a:latin typeface="Cambria Math" panose="02040503050406030204" pitchFamily="18" charset="0"/>
+                <a:ea typeface="Cambria Math" panose="02040503050406030204" pitchFamily="18" charset="0"/>
+              </a:rPr>
+              <a:t>Malacria</a:t>
+            </a:r>
+            <a:r>
+              <a:rPr lang="en-GB" sz="800" dirty="0">
+                <a:latin typeface="Cambria Math" panose="02040503050406030204" pitchFamily="18" charset="0"/>
+                <a:ea typeface="Cambria Math" panose="02040503050406030204" pitchFamily="18" charset="0"/>
+              </a:rPr>
+              <a:t>, Sylvain, et al. "Promoting hotkey use through rehearsal with </a:t>
+            </a:r>
+            <a:r>
+              <a:rPr lang="en-GB" sz="800" dirty="0" err="1">
+                <a:latin typeface="Cambria Math" panose="02040503050406030204" pitchFamily="18" charset="0"/>
+                <a:ea typeface="Cambria Math" panose="02040503050406030204" pitchFamily="18" charset="0"/>
+              </a:rPr>
+              <a:t>exposehk</a:t>
+            </a:r>
+            <a:r>
+              <a:rPr lang="en-GB" sz="800" dirty="0">
+                <a:latin typeface="Cambria Math" panose="02040503050406030204" pitchFamily="18" charset="0"/>
+                <a:ea typeface="Cambria Math" panose="02040503050406030204" pitchFamily="18" charset="0"/>
+              </a:rPr>
+              <a:t>." Proceedings of the SIGCHI Conference on Human Factors in Computing Systems. ACM, 2013.</a:t>
+            </a:r>
+          </a:p>
+          <a:p>
+            <a:pPr marL="45720" indent="0">
+              <a:lnSpc>
+                <a:spcPct val="120000"/>
+              </a:lnSpc>
+              <a:spcBef>
+                <a:spcPts val="600"/>
+              </a:spcBef>
+              <a:buNone/>
+            </a:pPr>
+            <a:r>
+              <a:rPr lang="en-GB" sz="800" dirty="0">
+                <a:latin typeface="Cambria Math" panose="02040503050406030204" pitchFamily="18" charset="0"/>
+                <a:ea typeface="Cambria Math" panose="02040503050406030204" pitchFamily="18" charset="0"/>
+              </a:rPr>
+              <a:t>[NIELSEN1990] Nielsen, </a:t>
+            </a:r>
+            <a:r>
+              <a:rPr lang="en-GB" sz="800" dirty="0" err="1">
+                <a:latin typeface="Cambria Math" panose="02040503050406030204" pitchFamily="18" charset="0"/>
+                <a:ea typeface="Cambria Math" panose="02040503050406030204" pitchFamily="18" charset="0"/>
+              </a:rPr>
+              <a:t>Jakob</a:t>
+            </a:r>
+            <a:r>
+              <a:rPr lang="en-GB" sz="800" dirty="0">
+                <a:latin typeface="Cambria Math" panose="02040503050406030204" pitchFamily="18" charset="0"/>
+                <a:ea typeface="Cambria Math" panose="02040503050406030204" pitchFamily="18" charset="0"/>
+              </a:rPr>
+              <a:t>, and Rolf </a:t>
+            </a:r>
+            <a:r>
+              <a:rPr lang="en-GB" sz="800" dirty="0" err="1">
+                <a:latin typeface="Cambria Math" panose="02040503050406030204" pitchFamily="18" charset="0"/>
+                <a:ea typeface="Cambria Math" panose="02040503050406030204" pitchFamily="18" charset="0"/>
+              </a:rPr>
+              <a:t>Molich</a:t>
+            </a:r>
+            <a:r>
+              <a:rPr lang="en-GB" sz="800" dirty="0">
+                <a:latin typeface="Cambria Math" panose="02040503050406030204" pitchFamily="18" charset="0"/>
+                <a:ea typeface="Cambria Math" panose="02040503050406030204" pitchFamily="18" charset="0"/>
+              </a:rPr>
+              <a:t>. "Heuristic evaluation of user interfaces." Proceedings of the SIGCHI conference on Human factors in computing systems. ACM, 1990.</a:t>
+            </a:r>
+          </a:p>
+          <a:p>
+            <a:pPr marL="45720" indent="0">
+              <a:lnSpc>
+                <a:spcPct val="120000"/>
+              </a:lnSpc>
+              <a:spcBef>
+                <a:spcPts val="600"/>
+              </a:spcBef>
+              <a:buNone/>
+            </a:pPr>
+            <a:r>
+              <a:rPr lang="en-GB" sz="800" dirty="0">
+                <a:latin typeface="Cambria Math" panose="02040503050406030204" pitchFamily="18" charset="0"/>
+                <a:ea typeface="Cambria Math" panose="02040503050406030204" pitchFamily="18" charset="0"/>
+              </a:rPr>
+              <a:t>[NIELSEN1994] Nielsen, </a:t>
+            </a:r>
+            <a:r>
+              <a:rPr lang="en-GB" sz="800" dirty="0" err="1">
+                <a:latin typeface="Cambria Math" panose="02040503050406030204" pitchFamily="18" charset="0"/>
+                <a:ea typeface="Cambria Math" panose="02040503050406030204" pitchFamily="18" charset="0"/>
+              </a:rPr>
+              <a:t>Jakob</a:t>
+            </a:r>
+            <a:r>
+              <a:rPr lang="en-GB" sz="800" dirty="0">
+                <a:latin typeface="Cambria Math" panose="02040503050406030204" pitchFamily="18" charset="0"/>
+                <a:ea typeface="Cambria Math" panose="02040503050406030204" pitchFamily="18" charset="0"/>
+              </a:rPr>
+              <a:t>. "Heuristic evaluation." Usability inspection methods 17.1 (1994).</a:t>
+            </a:r>
+          </a:p>
+          <a:p>
+            <a:pPr marL="45720" indent="0">
+              <a:lnSpc>
+                <a:spcPct val="120000"/>
+              </a:lnSpc>
+              <a:spcBef>
+                <a:spcPts val="600"/>
+              </a:spcBef>
+              <a:buNone/>
+            </a:pPr>
+            <a:r>
+              <a:rPr lang="en-GB" sz="800" dirty="0">
+                <a:latin typeface="Cambria Math" panose="02040503050406030204" pitchFamily="18" charset="0"/>
+                <a:ea typeface="Cambria Math" panose="02040503050406030204" pitchFamily="18" charset="0"/>
+              </a:rPr>
+              <a:t>[NIELSEN1995] Nielsen, </a:t>
+            </a:r>
+            <a:r>
+              <a:rPr lang="en-GB" sz="800" dirty="0" err="1">
+                <a:latin typeface="Cambria Math" panose="02040503050406030204" pitchFamily="18" charset="0"/>
+                <a:ea typeface="Cambria Math" panose="02040503050406030204" pitchFamily="18" charset="0"/>
+              </a:rPr>
+              <a:t>Jakob</a:t>
+            </a:r>
+            <a:r>
+              <a:rPr lang="en-GB" sz="800" dirty="0">
+                <a:latin typeface="Cambria Math" panose="02040503050406030204" pitchFamily="18" charset="0"/>
+                <a:ea typeface="Cambria Math" panose="02040503050406030204" pitchFamily="18" charset="0"/>
+              </a:rPr>
+              <a:t>. "10 Usability Heuristics for User Interface Design". (1995). (https://www.nngroup.com/articles/ten-usability-heuristics/, retrieved 11/09/2016)</a:t>
+            </a:r>
+          </a:p>
+          <a:p>
+            <a:pPr marL="45720" indent="0">
+              <a:lnSpc>
+                <a:spcPct val="120000"/>
+              </a:lnSpc>
+              <a:spcBef>
+                <a:spcPts val="600"/>
+              </a:spcBef>
+              <a:buNone/>
+            </a:pPr>
+            <a:r>
+              <a:rPr lang="en-GB" sz="800" dirty="0">
+                <a:latin typeface="Cambria Math" panose="02040503050406030204" pitchFamily="18" charset="0"/>
+                <a:ea typeface="Cambria Math" panose="02040503050406030204" pitchFamily="18" charset="0"/>
+              </a:rPr>
+              <a:t>[NIELSEN2015] Nielsen, </a:t>
+            </a:r>
+            <a:r>
+              <a:rPr lang="en-GB" sz="800" dirty="0" err="1">
+                <a:latin typeface="Cambria Math" panose="02040503050406030204" pitchFamily="18" charset="0"/>
+                <a:ea typeface="Cambria Math" panose="02040503050406030204" pitchFamily="18" charset="0"/>
+              </a:rPr>
+              <a:t>Jakob</a:t>
+            </a:r>
+            <a:r>
+              <a:rPr lang="en-GB" sz="800" dirty="0">
+                <a:latin typeface="Cambria Math" panose="02040503050406030204" pitchFamily="18" charset="0"/>
+                <a:ea typeface="Cambria Math" panose="02040503050406030204" pitchFamily="18" charset="0"/>
+              </a:rPr>
+              <a:t>. "Banish the Hamburger Menu, Adopt Pizza Menus". (2015). (https://www.nngroup.com/articles/hamburger-menu-vs-pizza/, retrieved 11/09/2016)</a:t>
+            </a:r>
+          </a:p>
+          <a:p>
+            <a:pPr marL="45720" indent="0">
+              <a:lnSpc>
+                <a:spcPct val="120000"/>
+              </a:lnSpc>
+              <a:spcBef>
+                <a:spcPts val="600"/>
+              </a:spcBef>
+              <a:buNone/>
+            </a:pPr>
+            <a:r>
+              <a:rPr lang="en-GB" sz="800" dirty="0">
+                <a:latin typeface="Cambria Math" panose="02040503050406030204" pitchFamily="18" charset="0"/>
+                <a:ea typeface="Cambria Math" panose="02040503050406030204" pitchFamily="18" charset="0"/>
+              </a:rPr>
+              <a:t>[NORMAN2013] Norman, Donald A. The design of everyday things: Revised and expanded edition. Basic books, 2013.</a:t>
+            </a:r>
+          </a:p>
+          <a:p>
+            <a:pPr marL="45720" indent="0">
+              <a:lnSpc>
+                <a:spcPct val="120000"/>
+              </a:lnSpc>
+              <a:spcBef>
+                <a:spcPts val="600"/>
+              </a:spcBef>
+              <a:buNone/>
+            </a:pPr>
+            <a:r>
+              <a:rPr lang="en-GB" sz="800" dirty="0">
+                <a:latin typeface="Cambria Math" panose="02040503050406030204" pitchFamily="18" charset="0"/>
+                <a:ea typeface="Cambria Math" panose="02040503050406030204" pitchFamily="18" charset="0"/>
+              </a:rPr>
+              <a:t>[OULASVIRTA2011] </a:t>
+            </a:r>
+            <a:r>
+              <a:rPr lang="en-GB" sz="800" dirty="0" err="1">
+                <a:latin typeface="Cambria Math" panose="02040503050406030204" pitchFamily="18" charset="0"/>
+                <a:ea typeface="Cambria Math" panose="02040503050406030204" pitchFamily="18" charset="0"/>
+              </a:rPr>
+              <a:t>Oulasvirta</a:t>
+            </a:r>
+            <a:r>
+              <a:rPr lang="en-GB" sz="800" dirty="0">
+                <a:latin typeface="Cambria Math" panose="02040503050406030204" pitchFamily="18" charset="0"/>
+                <a:ea typeface="Cambria Math" panose="02040503050406030204" pitchFamily="18" charset="0"/>
+              </a:rPr>
+              <a:t>, Antti, and Joanna Bergstrom-</a:t>
+            </a:r>
+            <a:r>
+              <a:rPr lang="en-GB" sz="800" dirty="0" err="1">
+                <a:latin typeface="Cambria Math" panose="02040503050406030204" pitchFamily="18" charset="0"/>
+                <a:ea typeface="Cambria Math" panose="02040503050406030204" pitchFamily="18" charset="0"/>
+              </a:rPr>
+              <a:t>Lehtovirta</a:t>
+            </a:r>
+            <a:r>
+              <a:rPr lang="en-GB" sz="800" dirty="0">
+                <a:latin typeface="Cambria Math" panose="02040503050406030204" pitchFamily="18" charset="0"/>
+                <a:ea typeface="Cambria Math" panose="02040503050406030204" pitchFamily="18" charset="0"/>
+              </a:rPr>
+              <a:t>. "Ease of juggling: studying the effects of manual multitasking." Proceedings of the SIGCHI Conference on Human Factors in Computing Systems. ACM, 2011.</a:t>
+            </a:r>
+          </a:p>
+          <a:p>
+            <a:pPr marL="45720" indent="0">
+              <a:lnSpc>
+                <a:spcPct val="120000"/>
+              </a:lnSpc>
+              <a:spcBef>
+                <a:spcPts val="600"/>
+              </a:spcBef>
+              <a:buNone/>
+            </a:pPr>
+            <a:r>
+              <a:rPr lang="en-GB" sz="800" dirty="0">
+                <a:latin typeface="Cambria Math" panose="02040503050406030204" pitchFamily="18" charset="0"/>
+                <a:ea typeface="Cambria Math" panose="02040503050406030204" pitchFamily="18" charset="0"/>
+              </a:rPr>
+              <a:t>[ROGERS2011] Rogers, Y., </a:t>
+            </a:r>
+            <a:r>
+              <a:rPr lang="en-GB" sz="800" dirty="0" err="1">
+                <a:latin typeface="Cambria Math" panose="02040503050406030204" pitchFamily="18" charset="0"/>
+                <a:ea typeface="Cambria Math" panose="02040503050406030204" pitchFamily="18" charset="0"/>
+              </a:rPr>
+              <a:t>Preece</a:t>
+            </a:r>
+            <a:r>
+              <a:rPr lang="en-GB" sz="800" dirty="0">
+                <a:latin typeface="Cambria Math" panose="02040503050406030204" pitchFamily="18" charset="0"/>
+                <a:ea typeface="Cambria Math" panose="02040503050406030204" pitchFamily="18" charset="0"/>
+              </a:rPr>
+              <a:t>, J. &amp; Sharp, H. Interaction Design, Wiley &amp; Sons 2011. </a:t>
+            </a:r>
+          </a:p>
+          <a:p>
+            <a:pPr marL="45720" indent="0">
+              <a:lnSpc>
+                <a:spcPct val="120000"/>
+              </a:lnSpc>
+              <a:spcBef>
+                <a:spcPts val="600"/>
+              </a:spcBef>
+              <a:buNone/>
+            </a:pPr>
+            <a:r>
+              <a:rPr lang="en-GB" sz="800" dirty="0">
+                <a:latin typeface="Cambria Math" panose="02040503050406030204" pitchFamily="18" charset="0"/>
+                <a:ea typeface="Cambria Math" panose="02040503050406030204" pitchFamily="18" charset="0"/>
+              </a:rPr>
+              <a:t>[SAFFER2010] </a:t>
+            </a:r>
+            <a:r>
+              <a:rPr lang="en-GB" sz="800" dirty="0" err="1">
+                <a:latin typeface="Cambria Math" panose="02040503050406030204" pitchFamily="18" charset="0"/>
+                <a:ea typeface="Cambria Math" panose="02040503050406030204" pitchFamily="18" charset="0"/>
+              </a:rPr>
+              <a:t>Saffer</a:t>
+            </a:r>
+            <a:r>
+              <a:rPr lang="en-GB" sz="800" dirty="0">
+                <a:latin typeface="Cambria Math" panose="02040503050406030204" pitchFamily="18" charset="0"/>
+                <a:ea typeface="Cambria Math" panose="02040503050406030204" pitchFamily="18" charset="0"/>
+              </a:rPr>
+              <a:t>, Dan. Designing for interaction: creating innovative applications and devices. New Riders, 2010.</a:t>
+            </a:r>
+          </a:p>
+          <a:p>
+            <a:pPr marL="45720" indent="0">
+              <a:lnSpc>
+                <a:spcPct val="120000"/>
+              </a:lnSpc>
+              <a:spcBef>
+                <a:spcPts val="600"/>
+              </a:spcBef>
+              <a:buNone/>
+            </a:pPr>
+            <a:r>
+              <a:rPr lang="en-GB" sz="800" dirty="0">
+                <a:latin typeface="Cambria Math" panose="02040503050406030204" pitchFamily="18" charset="0"/>
+                <a:ea typeface="Cambria Math" panose="02040503050406030204" pitchFamily="18" charset="0"/>
+              </a:rPr>
+              <a:t>[TSIODOULOS2016] </a:t>
+            </a:r>
+            <a:r>
+              <a:rPr lang="en-GB" sz="800" dirty="0" err="1">
+                <a:latin typeface="Cambria Math" panose="02040503050406030204" pitchFamily="18" charset="0"/>
+                <a:ea typeface="Cambria Math" panose="02040503050406030204" pitchFamily="18" charset="0"/>
+              </a:rPr>
+              <a:t>Tsiodoulos</a:t>
+            </a:r>
+            <a:r>
+              <a:rPr lang="en-GB" sz="800" dirty="0">
+                <a:latin typeface="Cambria Math" panose="02040503050406030204" pitchFamily="18" charset="0"/>
+                <a:ea typeface="Cambria Math" panose="02040503050406030204" pitchFamily="18" charset="0"/>
+              </a:rPr>
+              <a:t>, </a:t>
+            </a:r>
+            <a:r>
+              <a:rPr lang="en-GB" sz="800" dirty="0" err="1">
+                <a:latin typeface="Cambria Math" panose="02040503050406030204" pitchFamily="18" charset="0"/>
+                <a:ea typeface="Cambria Math" panose="02040503050406030204" pitchFamily="18" charset="0"/>
+              </a:rPr>
+              <a:t>Dimitrios</a:t>
+            </a:r>
+            <a:r>
+              <a:rPr lang="en-GB" sz="800" dirty="0">
+                <a:latin typeface="Cambria Math" panose="02040503050406030204" pitchFamily="18" charset="0"/>
+                <a:ea typeface="Cambria Math" panose="02040503050406030204" pitchFamily="18" charset="0"/>
+              </a:rPr>
+              <a:t>. "Comparison of hamburger and bottom bar menu on mobile devices for three level navigation." (2016).</a:t>
+            </a:r>
+          </a:p>
+          <a:p>
+            <a:pPr marL="45720" indent="0">
+              <a:lnSpc>
+                <a:spcPct val="120000"/>
+              </a:lnSpc>
+              <a:spcBef>
+                <a:spcPts val="600"/>
+              </a:spcBef>
+              <a:buNone/>
+            </a:pPr>
+            <a:r>
+              <a:rPr lang="en-GB" sz="800" dirty="0">
+                <a:latin typeface="Cambria Math" panose="02040503050406030204" pitchFamily="18" charset="0"/>
+                <a:ea typeface="Cambria Math" panose="02040503050406030204" pitchFamily="18" charset="0"/>
+              </a:rPr>
+              <a:t>[WAGNER2012] Wagner, Julie, </a:t>
+            </a:r>
+            <a:r>
+              <a:rPr lang="en-GB" sz="800" dirty="0" err="1">
+                <a:latin typeface="Cambria Math" panose="02040503050406030204" pitchFamily="18" charset="0"/>
+                <a:ea typeface="Cambria Math" panose="02040503050406030204" pitchFamily="18" charset="0"/>
+              </a:rPr>
+              <a:t>Stéphane</a:t>
+            </a:r>
+            <a:r>
+              <a:rPr lang="en-GB" sz="800" dirty="0">
+                <a:latin typeface="Cambria Math" panose="02040503050406030204" pitchFamily="18" charset="0"/>
+                <a:ea typeface="Cambria Math" panose="02040503050406030204" pitchFamily="18" charset="0"/>
+              </a:rPr>
+              <a:t> </a:t>
+            </a:r>
+            <a:r>
+              <a:rPr lang="en-GB" sz="800" dirty="0" err="1">
+                <a:latin typeface="Cambria Math" panose="02040503050406030204" pitchFamily="18" charset="0"/>
+                <a:ea typeface="Cambria Math" panose="02040503050406030204" pitchFamily="18" charset="0"/>
+              </a:rPr>
+              <a:t>Huot</a:t>
+            </a:r>
+            <a:r>
+              <a:rPr lang="en-GB" sz="800" dirty="0">
+                <a:latin typeface="Cambria Math" panose="02040503050406030204" pitchFamily="18" charset="0"/>
+                <a:ea typeface="Cambria Math" panose="02040503050406030204" pitchFamily="18" charset="0"/>
+              </a:rPr>
+              <a:t>, and Wendy Mackay. "</a:t>
+            </a:r>
+            <a:r>
+              <a:rPr lang="en-GB" sz="800" dirty="0" err="1">
+                <a:latin typeface="Cambria Math" panose="02040503050406030204" pitchFamily="18" charset="0"/>
+                <a:ea typeface="Cambria Math" panose="02040503050406030204" pitchFamily="18" charset="0"/>
+              </a:rPr>
+              <a:t>BiTouch</a:t>
+            </a:r>
+            <a:r>
+              <a:rPr lang="en-GB" sz="800" dirty="0">
+                <a:latin typeface="Cambria Math" panose="02040503050406030204" pitchFamily="18" charset="0"/>
+                <a:ea typeface="Cambria Math" panose="02040503050406030204" pitchFamily="18" charset="0"/>
+              </a:rPr>
+              <a:t> and </a:t>
+            </a:r>
+            <a:r>
+              <a:rPr lang="en-GB" sz="800" dirty="0" err="1">
+                <a:latin typeface="Cambria Math" panose="02040503050406030204" pitchFamily="18" charset="0"/>
+                <a:ea typeface="Cambria Math" panose="02040503050406030204" pitchFamily="18" charset="0"/>
+              </a:rPr>
+              <a:t>BiPad</a:t>
+            </a:r>
+            <a:r>
+              <a:rPr lang="en-GB" sz="800" dirty="0">
+                <a:latin typeface="Cambria Math" panose="02040503050406030204" pitchFamily="18" charset="0"/>
+                <a:ea typeface="Cambria Math" panose="02040503050406030204" pitchFamily="18" charset="0"/>
+              </a:rPr>
+              <a:t>: designing bimanual interaction for hand-held tablets." Proceedings of the SIGCHI Conference on Human Factors in Computing Systems. ACM, 2012.</a:t>
+            </a:r>
+          </a:p>
+          <a:p>
+            <a:pPr marL="45720" indent="0">
+              <a:lnSpc>
+                <a:spcPct val="120000"/>
+              </a:lnSpc>
+              <a:spcBef>
+                <a:spcPts val="600"/>
+              </a:spcBef>
+              <a:buNone/>
+            </a:pPr>
+            <a:r>
+              <a:rPr lang="en-GB" sz="800" dirty="0">
+                <a:latin typeface="Cambria Math" panose="02040503050406030204" pitchFamily="18" charset="0"/>
+                <a:ea typeface="Cambria Math" panose="02040503050406030204" pitchFamily="18" charset="0"/>
+              </a:rPr>
+              <a:t>[YEE2003] Yee, </a:t>
+            </a:r>
+            <a:r>
+              <a:rPr lang="en-GB" sz="800" dirty="0" err="1">
+                <a:latin typeface="Cambria Math" panose="02040503050406030204" pitchFamily="18" charset="0"/>
+                <a:ea typeface="Cambria Math" panose="02040503050406030204" pitchFamily="18" charset="0"/>
+              </a:rPr>
+              <a:t>Ka</a:t>
+            </a:r>
+            <a:r>
+              <a:rPr lang="en-GB" sz="800" dirty="0">
+                <a:latin typeface="Cambria Math" panose="02040503050406030204" pitchFamily="18" charset="0"/>
+                <a:ea typeface="Cambria Math" panose="02040503050406030204" pitchFamily="18" charset="0"/>
+              </a:rPr>
+              <a:t>-Ping. "Peephole displays: pen interaction on spatially aware handheld computers." Proceedings of the SIGCHI conference on Human factors in computing systems. ACM, 2003.</a:t>
+            </a:r>
+          </a:p>
+          <a:p>
+            <a:pPr marL="45720" indent="0">
+              <a:lnSpc>
+                <a:spcPct val="120000"/>
+              </a:lnSpc>
+              <a:spcBef>
+                <a:spcPts val="600"/>
+              </a:spcBef>
+              <a:buNone/>
+            </a:pPr>
+            <a:r>
+              <a:rPr lang="en-GB" sz="800" dirty="0">
+                <a:latin typeface="Cambria Math" panose="02040503050406030204" pitchFamily="18" charset="0"/>
+                <a:ea typeface="Cambria Math" panose="02040503050406030204" pitchFamily="18" charset="0"/>
+              </a:rPr>
+              <a:t>[ZIEFLE2006] </a:t>
+            </a:r>
+            <a:r>
+              <a:rPr lang="en-GB" sz="800" dirty="0" err="1">
+                <a:latin typeface="Cambria Math" panose="02040503050406030204" pitchFamily="18" charset="0"/>
+                <a:ea typeface="Cambria Math" panose="02040503050406030204" pitchFamily="18" charset="0"/>
+              </a:rPr>
+              <a:t>Ziefle</a:t>
+            </a:r>
+            <a:r>
+              <a:rPr lang="en-GB" sz="800" dirty="0">
+                <a:latin typeface="Cambria Math" panose="02040503050406030204" pitchFamily="18" charset="0"/>
+                <a:ea typeface="Cambria Math" panose="02040503050406030204" pitchFamily="18" charset="0"/>
+              </a:rPr>
+              <a:t>, Martina, and Susanne Bay. "How to overcome disorientation in mobile phone menus: A comparison of two different types of navigation aids." Human-Computer Interaction 21.4 (2006): 393-433.</a:t>
+            </a:r>
+          </a:p>
+        </p:txBody>
+      </p:sp>
+    </p:spTree>
+    <p:extLst>
+      <p:ext uri="{BB962C8B-B14F-4D97-AF65-F5344CB8AC3E}">
+        <p14:creationId xmlns:p14="http://schemas.microsoft.com/office/powerpoint/2010/main" val="2808734110"/>
       </p:ext>
     </p:extLst>
   </p:cSld>

</xml_diff>